<commit_message>
Addding content to the pptx
</commit_message>
<xml_diff>
--- a/source/MySEProject/Documentation/Implement_the_KNN__Classifier_KNN_Quest.pptx
+++ b/source/MySEProject/Documentation/Implement_the_KNN__Classifier_KNN_Quest.pptx
@@ -3367,12 +3367,39 @@
         </p:nvSpPr>
         <p:spPr/>
         <p:txBody>
-          <a:bodyPr/>
-          <a:lstStyle/>
-          <a:p>
-            <a:r>
-              <a:rPr lang="en-US"/>
+          <a:bodyPr>
+            <a:normAutofit fontScale="85000" lnSpcReduction="20000"/>
+          </a:bodyPr>
+          <a:lstStyle/>
+          <a:p>
+            <a:r>
+              <a:rPr lang="en-US" dirty="0"/>
               <a:t>Team KNN Quest</a:t>
+            </a:r>
+          </a:p>
+          <a:p>
+            <a:r>
+              <a:rPr lang="en-US" dirty="0"/>
+              <a:t>Team members:</a:t>
+            </a:r>
+            <a:br>
+              <a:rPr lang="en-US" dirty="0"/>
+            </a:br>
+            <a:r>
+              <a:rPr lang="en-US" dirty="0"/>
+              <a:t>Kashif Hussain</a:t>
+            </a:r>
+          </a:p>
+          <a:p>
+            <a:r>
+              <a:rPr lang="en-US" dirty="0"/>
+              <a:t>Fahad Jabbar</a:t>
+            </a:r>
+          </a:p>
+          <a:p>
+            <a:r>
+              <a:rPr lang="en-US"/>
+              <a:t>Naila Shaheen</a:t>
             </a:r>
           </a:p>
         </p:txBody>

</xml_diff>

<commit_message>
Adding group members details
</commit_message>
<xml_diff>
--- a/source/MySEProject/Documentation/Implement_the_KNN__Classifier_KNN_Quest.pptx
+++ b/source/MySEProject/Documentation/Implement_the_KNN__Classifier_KNN_Quest.pptx
@@ -3339,13 +3339,20 @@
         </p:nvSpPr>
         <p:spPr/>
         <p:txBody>
-          <a:bodyPr/>
+          <a:bodyPr>
+            <a:normAutofit/>
+          </a:bodyPr>
           <a:lstStyle/>
           <a:p>
             <a:r>
               <a:rPr lang="en-US" dirty="0"/>
-              <a:t>Implement the KNN Classifier</a:t>
-            </a:r>
+              <a:t>Implement the KNN Classifier </a:t>
+            </a:r>
+            <a:r>
+              <a:rPr lang="en-US" sz="1400" dirty="0"/>
+              <a:t>(Team KNN Quest)</a:t>
+            </a:r>
+            <a:endParaRPr lang="en-US" dirty="0"/>
           </a:p>
         </p:txBody>
       </p:sp>
@@ -3365,21 +3372,24 @@
             <p:ph type="subTitle" idx="1"/>
           </p:nvPr>
         </p:nvSpPr>
-        <p:spPr/>
+        <p:spPr>
+          <a:xfrm>
+            <a:off x="1524000" y="4240213"/>
+            <a:ext cx="9144000" cy="1655762"/>
+          </a:xfrm>
+        </p:spPr>
         <p:txBody>
           <a:bodyPr>
-            <a:normAutofit fontScale="85000" lnSpcReduction="20000"/>
+            <a:normAutofit fontScale="92500" lnSpcReduction="10000"/>
           </a:bodyPr>
           <a:lstStyle/>
           <a:p>
             <a:r>
-              <a:rPr lang="en-US" dirty="0"/>
-              <a:t>Team KNN Quest</a:t>
-            </a:r>
-          </a:p>
-          <a:p>
-            <a:r>
-              <a:rPr lang="en-US" dirty="0"/>
+              <a:rPr lang="en-US" sz="3300" dirty="0">
+                <a:solidFill>
+                  <a:srgbClr val="002060"/>
+                </a:solidFill>
+              </a:rPr>
               <a:t>Team members:</a:t>
             </a:r>
             <a:br>
@@ -3398,7 +3408,7 @@
           </a:p>
           <a:p>
             <a:r>
-              <a:rPr lang="en-US"/>
+              <a:rPr lang="en-US" dirty="0"/>
               <a:t>Naila Shaheen</a:t>
             </a:r>
           </a:p>

</xml_diff>

<commit_message>
Defining agendas in ppt
</commit_message>
<xml_diff>
--- a/source/MySEProject/Documentation/Implement_the_KNN__Classifier_KNN_Quest.pptx
+++ b/source/MySEProject/Documentation/Implement_the_KNN__Classifier_KNN_Quest.pptx
@@ -4,8 +4,13 @@
   <p:sldMasterIdLst>
     <p:sldMasterId id="2147483648" r:id="rId1"/>
   </p:sldMasterIdLst>
+  <p:notesMasterIdLst>
+    <p:notesMasterId r:id="rId5"/>
+  </p:notesMasterIdLst>
   <p:sldIdLst>
     <p:sldId id="256" r:id="rId2"/>
+    <p:sldId id="257" r:id="rId3"/>
+    <p:sldId id="258" r:id="rId4"/>
   </p:sldIdLst>
   <p:sldSz cx="12192000" cy="6858000"/>
   <p:notesSz cx="6858000" cy="9144000"/>
@@ -104,7 +109,361 @@
       </a:defRPr>
     </a:lvl9pPr>
   </p:defaultTextStyle>
+  <p:extLst>
+    <p:ext uri="{EFAFB233-063F-42B5-8137-9DF3F51BA10A}">
+      <p15:sldGuideLst xmlns:p15="http://schemas.microsoft.com/office/powerpoint/2012/main"/>
+    </p:ext>
+  </p:extLst>
 </p:presentation>
+</file>
+
+<file path=ppt/notesMasters/notesMaster1.xml><?xml version="1.0" encoding="utf-8"?>
+<p:notesMaster xmlns:a="http://schemas.openxmlformats.org/drawingml/2006/main" xmlns:r="http://schemas.openxmlformats.org/officeDocument/2006/relationships" xmlns:p="http://schemas.openxmlformats.org/presentationml/2006/main">
+  <p:cSld>
+    <p:bg>
+      <p:bgRef idx="1001">
+        <a:schemeClr val="bg1"/>
+      </p:bgRef>
+    </p:bg>
+    <p:spTree>
+      <p:nvGrpSpPr>
+        <p:cNvPr id="1" name=""/>
+        <p:cNvGrpSpPr/>
+        <p:nvPr/>
+      </p:nvGrpSpPr>
+      <p:grpSpPr>
+        <a:xfrm>
+          <a:off x="0" y="0"/>
+          <a:ext cx="0" cy="0"/>
+          <a:chOff x="0" y="0"/>
+          <a:chExt cx="0" cy="0"/>
+        </a:xfrm>
+      </p:grpSpPr>
+      <p:sp>
+        <p:nvSpPr>
+          <p:cNvPr id="2" name="Header Placeholder 1"/>
+          <p:cNvSpPr>
+            <a:spLocks noGrp="1"/>
+          </p:cNvSpPr>
+          <p:nvPr>
+            <p:ph type="hdr" sz="quarter"/>
+          </p:nvPr>
+        </p:nvSpPr>
+        <p:spPr>
+          <a:xfrm>
+            <a:off x="0" y="0"/>
+            <a:ext cx="2971800" cy="458788"/>
+          </a:xfrm>
+          <a:prstGeom prst="rect">
+            <a:avLst/>
+          </a:prstGeom>
+        </p:spPr>
+        <p:txBody>
+          <a:bodyPr vert="horz" lIns="91440" tIns="45720" rIns="91440" bIns="45720" rtlCol="0"/>
+          <a:lstStyle>
+            <a:lvl1pPr algn="l">
+              <a:defRPr sz="1200"/>
+            </a:lvl1pPr>
+          </a:lstStyle>
+          <a:p>
+            <a:endParaRPr lang="en-US"/>
+          </a:p>
+        </p:txBody>
+      </p:sp>
+      <p:sp>
+        <p:nvSpPr>
+          <p:cNvPr id="3" name="Date Placeholder 2"/>
+          <p:cNvSpPr>
+            <a:spLocks noGrp="1"/>
+          </p:cNvSpPr>
+          <p:nvPr>
+            <p:ph type="dt" idx="1"/>
+          </p:nvPr>
+        </p:nvSpPr>
+        <p:spPr>
+          <a:xfrm>
+            <a:off x="3884613" y="0"/>
+            <a:ext cx="2971800" cy="458788"/>
+          </a:xfrm>
+          <a:prstGeom prst="rect">
+            <a:avLst/>
+          </a:prstGeom>
+        </p:spPr>
+        <p:txBody>
+          <a:bodyPr vert="horz" lIns="91440" tIns="45720" rIns="91440" bIns="45720" rtlCol="0"/>
+          <a:lstStyle>
+            <a:lvl1pPr algn="r">
+              <a:defRPr sz="1200"/>
+            </a:lvl1pPr>
+          </a:lstStyle>
+          <a:p>
+            <a:fld id="{9046BB7E-E3D5-4B6D-BECE-0345D54B8A81}" type="datetimeFigureOut">
+              <a:rPr lang="en-US" smtClean="0"/>
+              <a:t>3/24/2024</a:t>
+            </a:fld>
+            <a:endParaRPr lang="en-US"/>
+          </a:p>
+        </p:txBody>
+      </p:sp>
+      <p:sp>
+        <p:nvSpPr>
+          <p:cNvPr id="4" name="Slide Image Placeholder 3"/>
+          <p:cNvSpPr>
+            <a:spLocks noGrp="1" noRot="1" noChangeAspect="1"/>
+          </p:cNvSpPr>
+          <p:nvPr>
+            <p:ph type="sldImg" idx="2"/>
+          </p:nvPr>
+        </p:nvSpPr>
+        <p:spPr>
+          <a:xfrm>
+            <a:off x="685800" y="1143000"/>
+            <a:ext cx="5486400" cy="3086100"/>
+          </a:xfrm>
+          <a:prstGeom prst="rect">
+            <a:avLst/>
+          </a:prstGeom>
+          <a:noFill/>
+          <a:ln w="12700">
+            <a:solidFill>
+              <a:prstClr val="black"/>
+            </a:solidFill>
+          </a:ln>
+        </p:spPr>
+        <p:txBody>
+          <a:bodyPr vert="horz" lIns="91440" tIns="45720" rIns="91440" bIns="45720" rtlCol="0" anchor="ctr"/>
+          <a:lstStyle/>
+          <a:p>
+            <a:endParaRPr lang="en-US"/>
+          </a:p>
+        </p:txBody>
+      </p:sp>
+      <p:sp>
+        <p:nvSpPr>
+          <p:cNvPr id="5" name="Notes Placeholder 4"/>
+          <p:cNvSpPr>
+            <a:spLocks noGrp="1"/>
+          </p:cNvSpPr>
+          <p:nvPr>
+            <p:ph type="body" sz="quarter" idx="3"/>
+          </p:nvPr>
+        </p:nvSpPr>
+        <p:spPr>
+          <a:xfrm>
+            <a:off x="685800" y="4400550"/>
+            <a:ext cx="5486400" cy="3600450"/>
+          </a:xfrm>
+          <a:prstGeom prst="rect">
+            <a:avLst/>
+          </a:prstGeom>
+        </p:spPr>
+        <p:txBody>
+          <a:bodyPr vert="horz" lIns="91440" tIns="45720" rIns="91440" bIns="45720" rtlCol="0"/>
+          <a:lstStyle/>
+          <a:p>
+            <a:pPr lvl="0"/>
+            <a:r>
+              <a:rPr lang="en-US"/>
+              <a:t>Click to edit Master text styles</a:t>
+            </a:r>
+          </a:p>
+          <a:p>
+            <a:pPr lvl="1"/>
+            <a:r>
+              <a:rPr lang="en-US"/>
+              <a:t>Second level</a:t>
+            </a:r>
+          </a:p>
+          <a:p>
+            <a:pPr lvl="2"/>
+            <a:r>
+              <a:rPr lang="en-US"/>
+              <a:t>Third level</a:t>
+            </a:r>
+          </a:p>
+          <a:p>
+            <a:pPr lvl="3"/>
+            <a:r>
+              <a:rPr lang="en-US"/>
+              <a:t>Fourth level</a:t>
+            </a:r>
+          </a:p>
+          <a:p>
+            <a:pPr lvl="4"/>
+            <a:r>
+              <a:rPr lang="en-US"/>
+              <a:t>Fifth level</a:t>
+            </a:r>
+          </a:p>
+        </p:txBody>
+      </p:sp>
+      <p:sp>
+        <p:nvSpPr>
+          <p:cNvPr id="6" name="Footer Placeholder 5"/>
+          <p:cNvSpPr>
+            <a:spLocks noGrp="1"/>
+          </p:cNvSpPr>
+          <p:nvPr>
+            <p:ph type="ftr" sz="quarter" idx="4"/>
+          </p:nvPr>
+        </p:nvSpPr>
+        <p:spPr>
+          <a:xfrm>
+            <a:off x="0" y="8685213"/>
+            <a:ext cx="2971800" cy="458787"/>
+          </a:xfrm>
+          <a:prstGeom prst="rect">
+            <a:avLst/>
+          </a:prstGeom>
+        </p:spPr>
+        <p:txBody>
+          <a:bodyPr vert="horz" lIns="91440" tIns="45720" rIns="91440" bIns="45720" rtlCol="0" anchor="b"/>
+          <a:lstStyle>
+            <a:lvl1pPr algn="l">
+              <a:defRPr sz="1200"/>
+            </a:lvl1pPr>
+          </a:lstStyle>
+          <a:p>
+            <a:endParaRPr lang="en-US"/>
+          </a:p>
+        </p:txBody>
+      </p:sp>
+      <p:sp>
+        <p:nvSpPr>
+          <p:cNvPr id="7" name="Slide Number Placeholder 6"/>
+          <p:cNvSpPr>
+            <a:spLocks noGrp="1"/>
+          </p:cNvSpPr>
+          <p:nvPr>
+            <p:ph type="sldNum" sz="quarter" idx="5"/>
+          </p:nvPr>
+        </p:nvSpPr>
+        <p:spPr>
+          <a:xfrm>
+            <a:off x="3884613" y="8685213"/>
+            <a:ext cx="2971800" cy="458787"/>
+          </a:xfrm>
+          <a:prstGeom prst="rect">
+            <a:avLst/>
+          </a:prstGeom>
+        </p:spPr>
+        <p:txBody>
+          <a:bodyPr vert="horz" lIns="91440" tIns="45720" rIns="91440" bIns="45720" rtlCol="0" anchor="b"/>
+          <a:lstStyle>
+            <a:lvl1pPr algn="r">
+              <a:defRPr sz="1200"/>
+            </a:lvl1pPr>
+          </a:lstStyle>
+          <a:p>
+            <a:fld id="{422119F3-30C4-435A-845C-2AA91AFE93DE}" type="slidenum">
+              <a:rPr lang="en-US" smtClean="0"/>
+              <a:t>‹#›</a:t>
+            </a:fld>
+            <a:endParaRPr lang="en-US"/>
+          </a:p>
+        </p:txBody>
+      </p:sp>
+    </p:spTree>
+    <p:extLst>
+      <p:ext uri="{BB962C8B-B14F-4D97-AF65-F5344CB8AC3E}">
+        <p14:creationId xmlns:p14="http://schemas.microsoft.com/office/powerpoint/2010/main" val="1986740440"/>
+      </p:ext>
+    </p:extLst>
+  </p:cSld>
+  <p:clrMap bg1="lt1" tx1="dk1" bg2="lt2" tx2="dk2" accent1="accent1" accent2="accent2" accent3="accent3" accent4="accent4" accent5="accent5" accent6="accent6" hlink="hlink" folHlink="folHlink"/>
+  <p:notesStyle>
+    <a:lvl1pPr marL="0" algn="l" defTabSz="914400" rtl="0" eaLnBrk="1" latinLnBrk="0" hangingPunct="1">
+      <a:defRPr sz="1200" kern="1200">
+        <a:solidFill>
+          <a:schemeClr val="tx1"/>
+        </a:solidFill>
+        <a:latin typeface="+mn-lt"/>
+        <a:ea typeface="+mn-ea"/>
+        <a:cs typeface="+mn-cs"/>
+      </a:defRPr>
+    </a:lvl1pPr>
+    <a:lvl2pPr marL="457200" algn="l" defTabSz="914400" rtl="0" eaLnBrk="1" latinLnBrk="0" hangingPunct="1">
+      <a:defRPr sz="1200" kern="1200">
+        <a:solidFill>
+          <a:schemeClr val="tx1"/>
+        </a:solidFill>
+        <a:latin typeface="+mn-lt"/>
+        <a:ea typeface="+mn-ea"/>
+        <a:cs typeface="+mn-cs"/>
+      </a:defRPr>
+    </a:lvl2pPr>
+    <a:lvl3pPr marL="914400" algn="l" defTabSz="914400" rtl="0" eaLnBrk="1" latinLnBrk="0" hangingPunct="1">
+      <a:defRPr sz="1200" kern="1200">
+        <a:solidFill>
+          <a:schemeClr val="tx1"/>
+        </a:solidFill>
+        <a:latin typeface="+mn-lt"/>
+        <a:ea typeface="+mn-ea"/>
+        <a:cs typeface="+mn-cs"/>
+      </a:defRPr>
+    </a:lvl3pPr>
+    <a:lvl4pPr marL="1371600" algn="l" defTabSz="914400" rtl="0" eaLnBrk="1" latinLnBrk="0" hangingPunct="1">
+      <a:defRPr sz="1200" kern="1200">
+        <a:solidFill>
+          <a:schemeClr val="tx1"/>
+        </a:solidFill>
+        <a:latin typeface="+mn-lt"/>
+        <a:ea typeface="+mn-ea"/>
+        <a:cs typeface="+mn-cs"/>
+      </a:defRPr>
+    </a:lvl4pPr>
+    <a:lvl5pPr marL="1828800" algn="l" defTabSz="914400" rtl="0" eaLnBrk="1" latinLnBrk="0" hangingPunct="1">
+      <a:defRPr sz="1200" kern="1200">
+        <a:solidFill>
+          <a:schemeClr val="tx1"/>
+        </a:solidFill>
+        <a:latin typeface="+mn-lt"/>
+        <a:ea typeface="+mn-ea"/>
+        <a:cs typeface="+mn-cs"/>
+      </a:defRPr>
+    </a:lvl5pPr>
+    <a:lvl6pPr marL="2286000" algn="l" defTabSz="914400" rtl="0" eaLnBrk="1" latinLnBrk="0" hangingPunct="1">
+      <a:defRPr sz="1200" kern="1200">
+        <a:solidFill>
+          <a:schemeClr val="tx1"/>
+        </a:solidFill>
+        <a:latin typeface="+mn-lt"/>
+        <a:ea typeface="+mn-ea"/>
+        <a:cs typeface="+mn-cs"/>
+      </a:defRPr>
+    </a:lvl6pPr>
+    <a:lvl7pPr marL="2743200" algn="l" defTabSz="914400" rtl="0" eaLnBrk="1" latinLnBrk="0" hangingPunct="1">
+      <a:defRPr sz="1200" kern="1200">
+        <a:solidFill>
+          <a:schemeClr val="tx1"/>
+        </a:solidFill>
+        <a:latin typeface="+mn-lt"/>
+        <a:ea typeface="+mn-ea"/>
+        <a:cs typeface="+mn-cs"/>
+      </a:defRPr>
+    </a:lvl7pPr>
+    <a:lvl8pPr marL="3200400" algn="l" defTabSz="914400" rtl="0" eaLnBrk="1" latinLnBrk="0" hangingPunct="1">
+      <a:defRPr sz="1200" kern="1200">
+        <a:solidFill>
+          <a:schemeClr val="tx1"/>
+        </a:solidFill>
+        <a:latin typeface="+mn-lt"/>
+        <a:ea typeface="+mn-ea"/>
+        <a:cs typeface="+mn-cs"/>
+      </a:defRPr>
+    </a:lvl8pPr>
+    <a:lvl9pPr marL="3657600" algn="l" defTabSz="914400" rtl="0" eaLnBrk="1" latinLnBrk="0" hangingPunct="1">
+      <a:defRPr sz="1200" kern="1200">
+        <a:solidFill>
+          <a:schemeClr val="tx1"/>
+        </a:solidFill>
+        <a:latin typeface="+mn-lt"/>
+        <a:ea typeface="+mn-ea"/>
+        <a:cs typeface="+mn-cs"/>
+      </a:defRPr>
+    </a:lvl9pPr>
+  </p:notesStyle>
+</p:notesMaster>
 </file>
 
 <file path=ppt/slideLayouts/slideLayout1.xml><?xml version="1.0" encoding="utf-8"?>
@@ -137,7 +496,7 @@
             <a:spLocks noGrp="1"/>
           </p:cNvSpPr>
           <p:nvPr>
-            <p:ph type="ctrTitle"/>
+            <p:ph type="ctrTitle" hasCustomPrompt="1"/>
           </p:nvPr>
         </p:nvSpPr>
         <p:spPr>
@@ -150,13 +509,16 @@
           <a:bodyPr anchor="b"/>
           <a:lstStyle>
             <a:lvl1pPr algn="ctr">
-              <a:defRPr sz="6000"/>
+              <a:defRPr sz="6000">
+                <a:latin typeface="Arial" panose="020B0604020202020204" pitchFamily="34" charset="0"/>
+                <a:cs typeface="Arial" panose="020B0604020202020204" pitchFamily="34" charset="0"/>
+              </a:defRPr>
             </a:lvl1pPr>
           </a:lstStyle>
           <a:p>
             <a:r>
-              <a:rPr lang="en-US"/>
-              <a:t>Click to edit Master title style</a:t>
+              <a:rPr lang="en-US" dirty="0"/>
+              <a:t>Implement the KNN Classifier</a:t>
             </a:r>
           </a:p>
         </p:txBody>
@@ -174,13 +536,13 @@
             <a:spLocks noGrp="1"/>
           </p:cNvSpPr>
           <p:nvPr>
-            <p:ph type="subTitle" idx="1"/>
+            <p:ph type="subTitle" idx="1" hasCustomPrompt="1"/>
           </p:nvPr>
         </p:nvSpPr>
         <p:spPr>
           <a:xfrm>
-            <a:off x="1524000" y="3602038"/>
-            <a:ext cx="9144000" cy="1655762"/>
+            <a:off x="1524000" y="3602037"/>
+            <a:ext cx="9144000" cy="2387599"/>
           </a:xfrm>
         </p:spPr>
         <p:txBody>
@@ -225,9 +587,38 @@
           </a:lstStyle>
           <a:p>
             <a:r>
-              <a:rPr lang="en-US"/>
-              <a:t>Click to edit Master subtitle style</a:t>
-            </a:r>
+              <a:rPr lang="en-US" dirty="0"/>
+              <a:t>Presented by KNN Quest</a:t>
+            </a:r>
+          </a:p>
+          <a:p>
+            <a:r>
+              <a:rPr lang="en-US" dirty="0"/>
+              <a:t>Kashif Hussain  - M#</a:t>
+            </a:r>
+          </a:p>
+          <a:p>
+            <a:r>
+              <a:rPr lang="en-US" dirty="0"/>
+              <a:t>Fahad Jabbar – M#</a:t>
+            </a:r>
+          </a:p>
+          <a:p>
+            <a:r>
+              <a:rPr lang="en-US" dirty="0"/>
+              <a:t>Naila Shaheen – M#</a:t>
+            </a:r>
+          </a:p>
+          <a:p>
+            <a:r>
+              <a:rPr lang="en-US" dirty="0"/>
+              <a:t>                                                                        Guided by Prof. Dr. Damir </a:t>
+            </a:r>
+            <a:r>
+              <a:rPr lang="en-US" dirty="0" err="1"/>
+              <a:t>Dobric</a:t>
+            </a:r>
+            <a:endParaRPr lang="en-US" dirty="0"/>
           </a:p>
         </p:txBody>
       </p:sp>
@@ -250,13 +641,17 @@
         <p:spPr/>
         <p:txBody>
           <a:bodyPr/>
-          <a:lstStyle/>
-          <a:p>
-            <a:fld id="{8B038832-51DE-4940-9CEC-CF717FE6CECB}" type="datetimeFigureOut">
-              <a:rPr lang="en-US" smtClean="0"/>
-              <a:t>3/23/2024</a:t>
+          <a:lstStyle>
+            <a:lvl1pPr>
+              <a:defRPr/>
+            </a:lvl1pPr>
+          </a:lstStyle>
+          <a:p>
+            <a:fld id="{A8EF2C91-D8EB-49E6-A745-680FC1324D43}" type="datetime1">
+              <a:rPr lang="de-DE" smtClean="0"/>
+              <a:t>24.03.2024</a:t>
             </a:fld>
-            <a:endParaRPr lang="en-US"/>
+            <a:endParaRPr lang="en-US" dirty="0"/>
           </a:p>
         </p:txBody>
       </p:sp>
@@ -281,7 +676,7 @@
           <a:bodyPr/>
           <a:lstStyle/>
           <a:p>
-            <a:endParaRPr lang="en-US"/>
+            <a:endParaRPr lang="en-US" dirty="0"/>
           </a:p>
         </p:txBody>
       </p:sp>
@@ -310,10 +705,55 @@
               <a:rPr lang="en-US" smtClean="0"/>
               <a:t>‹#›</a:t>
             </a:fld>
-            <a:endParaRPr lang="en-US"/>
-          </a:p>
-        </p:txBody>
-      </p:sp>
+            <a:endParaRPr lang="en-US" dirty="0"/>
+          </a:p>
+        </p:txBody>
+      </p:sp>
+      <p:pic>
+        <p:nvPicPr>
+          <p:cNvPr id="2050" name="Picture 2" descr="Frankfurt University of Applied Sciences (@FrankfurtUAS) / X">
+            <a:extLst>
+              <a:ext uri="{FF2B5EF4-FFF2-40B4-BE49-F238E27FC236}">
+                <a16:creationId xmlns:a16="http://schemas.microsoft.com/office/drawing/2014/main" id="{A48401DE-69F3-1A47-A90A-55CBBBA72C07}"/>
+              </a:ext>
+            </a:extLst>
+          </p:cNvPr>
+          <p:cNvPicPr>
+            <a:picLocks noChangeAspect="1" noChangeArrowheads="1"/>
+          </p:cNvPicPr>
+          <p:nvPr userDrawn="1"/>
+        </p:nvPicPr>
+        <p:blipFill rotWithShape="1">
+          <a:blip r:embed="rId2">
+            <a:extLst>
+              <a:ext uri="{28A0092B-C50C-407E-A947-70E740481C1C}">
+                <a14:useLocalDpi xmlns:a14="http://schemas.microsoft.com/office/drawing/2010/main" val="0"/>
+              </a:ext>
+            </a:extLst>
+          </a:blip>
+          <a:srcRect l="883" t="28064" r="407" b="25907"/>
+          <a:stretch/>
+        </p:blipFill>
+        <p:spPr bwMode="auto">
+          <a:xfrm>
+            <a:off x="10469654" y="72957"/>
+            <a:ext cx="1663981" cy="775915"/>
+          </a:xfrm>
+          <a:prstGeom prst="rect">
+            <a:avLst/>
+          </a:prstGeom>
+          <a:noFill/>
+          <a:extLst>
+            <a:ext uri="{909E8E84-426E-40DD-AFC4-6F175D3DCCD1}">
+              <a14:hiddenFill xmlns:a14="http://schemas.microsoft.com/office/drawing/2010/main">
+                <a:solidFill>
+                  <a:srgbClr val="FFFFFF"/>
+                </a:solidFill>
+              </a14:hiddenFill>
+            </a:ext>
+          </a:extLst>
+        </p:spPr>
+      </p:pic>
     </p:spTree>
     <p:extLst>
       <p:ext uri="{BB962C8B-B14F-4D97-AF65-F5344CB8AC3E}">
@@ -328,204 +768,6 @@
 </file>
 
 <file path=ppt/slideLayouts/slideLayout10.xml><?xml version="1.0" encoding="utf-8"?>
-<p:sldLayout xmlns:a="http://schemas.openxmlformats.org/drawingml/2006/main" xmlns:r="http://schemas.openxmlformats.org/officeDocument/2006/relationships" xmlns:p="http://schemas.openxmlformats.org/presentationml/2006/main" type="vertTx" preserve="1">
-  <p:cSld name="Title and Vertical Text">
-    <p:spTree>
-      <p:nvGrpSpPr>
-        <p:cNvPr id="1" name=""/>
-        <p:cNvGrpSpPr/>
-        <p:nvPr/>
-      </p:nvGrpSpPr>
-      <p:grpSpPr>
-        <a:xfrm>
-          <a:off x="0" y="0"/>
-          <a:ext cx="0" cy="0"/>
-          <a:chOff x="0" y="0"/>
-          <a:chExt cx="0" cy="0"/>
-        </a:xfrm>
-      </p:grpSpPr>
-      <p:sp>
-        <p:nvSpPr>
-          <p:cNvPr id="2" name="Title 1">
-            <a:extLst>
-              <a:ext uri="{FF2B5EF4-FFF2-40B4-BE49-F238E27FC236}">
-                <a16:creationId xmlns:a16="http://schemas.microsoft.com/office/drawing/2014/main" id="{3DA5E5BC-2058-F485-9D41-ED91BECFA4ED}"/>
-              </a:ext>
-            </a:extLst>
-          </p:cNvPr>
-          <p:cNvSpPr>
-            <a:spLocks noGrp="1"/>
-          </p:cNvSpPr>
-          <p:nvPr>
-            <p:ph type="title"/>
-          </p:nvPr>
-        </p:nvSpPr>
-        <p:spPr/>
-        <p:txBody>
-          <a:bodyPr/>
-          <a:lstStyle/>
-          <a:p>
-            <a:r>
-              <a:rPr lang="en-US"/>
-              <a:t>Click to edit Master title style</a:t>
-            </a:r>
-          </a:p>
-        </p:txBody>
-      </p:sp>
-      <p:sp>
-        <p:nvSpPr>
-          <p:cNvPr id="3" name="Vertical Text Placeholder 2">
-            <a:extLst>
-              <a:ext uri="{FF2B5EF4-FFF2-40B4-BE49-F238E27FC236}">
-                <a16:creationId xmlns:a16="http://schemas.microsoft.com/office/drawing/2014/main" id="{1634B8C4-5FA2-D698-F368-4D8B4ADDFCDE}"/>
-              </a:ext>
-            </a:extLst>
-          </p:cNvPr>
-          <p:cNvSpPr>
-            <a:spLocks noGrp="1"/>
-          </p:cNvSpPr>
-          <p:nvPr>
-            <p:ph type="body" orient="vert" idx="1"/>
-          </p:nvPr>
-        </p:nvSpPr>
-        <p:spPr/>
-        <p:txBody>
-          <a:bodyPr vert="eaVert"/>
-          <a:lstStyle/>
-          <a:p>
-            <a:pPr lvl="0"/>
-            <a:r>
-              <a:rPr lang="en-US"/>
-              <a:t>Click to edit Master text styles</a:t>
-            </a:r>
-          </a:p>
-          <a:p>
-            <a:pPr lvl="1"/>
-            <a:r>
-              <a:rPr lang="en-US"/>
-              <a:t>Second level</a:t>
-            </a:r>
-          </a:p>
-          <a:p>
-            <a:pPr lvl="2"/>
-            <a:r>
-              <a:rPr lang="en-US"/>
-              <a:t>Third level</a:t>
-            </a:r>
-          </a:p>
-          <a:p>
-            <a:pPr lvl="3"/>
-            <a:r>
-              <a:rPr lang="en-US"/>
-              <a:t>Fourth level</a:t>
-            </a:r>
-          </a:p>
-          <a:p>
-            <a:pPr lvl="4"/>
-            <a:r>
-              <a:rPr lang="en-US"/>
-              <a:t>Fifth level</a:t>
-            </a:r>
-          </a:p>
-        </p:txBody>
-      </p:sp>
-      <p:sp>
-        <p:nvSpPr>
-          <p:cNvPr id="4" name="Date Placeholder 3">
-            <a:extLst>
-              <a:ext uri="{FF2B5EF4-FFF2-40B4-BE49-F238E27FC236}">
-                <a16:creationId xmlns:a16="http://schemas.microsoft.com/office/drawing/2014/main" id="{23A2A7CA-3FF6-C57C-976F-9F50E660C17C}"/>
-              </a:ext>
-            </a:extLst>
-          </p:cNvPr>
-          <p:cNvSpPr>
-            <a:spLocks noGrp="1"/>
-          </p:cNvSpPr>
-          <p:nvPr>
-            <p:ph type="dt" sz="half" idx="10"/>
-          </p:nvPr>
-        </p:nvSpPr>
-        <p:spPr/>
-        <p:txBody>
-          <a:bodyPr/>
-          <a:lstStyle/>
-          <a:p>
-            <a:fld id="{8B038832-51DE-4940-9CEC-CF717FE6CECB}" type="datetimeFigureOut">
-              <a:rPr lang="en-US" smtClean="0"/>
-              <a:t>3/23/2024</a:t>
-            </a:fld>
-            <a:endParaRPr lang="en-US"/>
-          </a:p>
-        </p:txBody>
-      </p:sp>
-      <p:sp>
-        <p:nvSpPr>
-          <p:cNvPr id="5" name="Footer Placeholder 4">
-            <a:extLst>
-              <a:ext uri="{FF2B5EF4-FFF2-40B4-BE49-F238E27FC236}">
-                <a16:creationId xmlns:a16="http://schemas.microsoft.com/office/drawing/2014/main" id="{615CDE6D-A9E9-9445-D3D3-5F040A510AB2}"/>
-              </a:ext>
-            </a:extLst>
-          </p:cNvPr>
-          <p:cNvSpPr>
-            <a:spLocks noGrp="1"/>
-          </p:cNvSpPr>
-          <p:nvPr>
-            <p:ph type="ftr" sz="quarter" idx="11"/>
-          </p:nvPr>
-        </p:nvSpPr>
-        <p:spPr/>
-        <p:txBody>
-          <a:bodyPr/>
-          <a:lstStyle/>
-          <a:p>
-            <a:endParaRPr lang="en-US"/>
-          </a:p>
-        </p:txBody>
-      </p:sp>
-      <p:sp>
-        <p:nvSpPr>
-          <p:cNvPr id="6" name="Slide Number Placeholder 5">
-            <a:extLst>
-              <a:ext uri="{FF2B5EF4-FFF2-40B4-BE49-F238E27FC236}">
-                <a16:creationId xmlns:a16="http://schemas.microsoft.com/office/drawing/2014/main" id="{ACE73FED-9719-E623-BA4A-25861D13FED0}"/>
-              </a:ext>
-            </a:extLst>
-          </p:cNvPr>
-          <p:cNvSpPr>
-            <a:spLocks noGrp="1"/>
-          </p:cNvSpPr>
-          <p:nvPr>
-            <p:ph type="sldNum" sz="quarter" idx="12"/>
-          </p:nvPr>
-        </p:nvSpPr>
-        <p:spPr/>
-        <p:txBody>
-          <a:bodyPr/>
-          <a:lstStyle/>
-          <a:p>
-            <a:fld id="{DDE4B26F-E58A-4C83-9619-68F81596DFD8}" type="slidenum">
-              <a:rPr lang="en-US" smtClean="0"/>
-              <a:t>‹#›</a:t>
-            </a:fld>
-            <a:endParaRPr lang="en-US"/>
-          </a:p>
-        </p:txBody>
-      </p:sp>
-    </p:spTree>
-    <p:extLst>
-      <p:ext uri="{BB962C8B-B14F-4D97-AF65-F5344CB8AC3E}">
-        <p14:creationId xmlns:p14="http://schemas.microsoft.com/office/powerpoint/2010/main" val="1866038492"/>
-      </p:ext>
-    </p:extLst>
-  </p:cSld>
-  <p:clrMapOvr>
-    <a:masterClrMapping/>
-  </p:clrMapOvr>
-</p:sldLayout>
-</file>
-
-<file path=ppt/slideLayouts/slideLayout11.xml><?xml version="1.0" encoding="utf-8"?>
 <p:sldLayout xmlns:a="http://schemas.openxmlformats.org/drawingml/2006/main" xmlns:r="http://schemas.openxmlformats.org/officeDocument/2006/relationships" xmlns:p="http://schemas.openxmlformats.org/presentationml/2006/main" type="vertTitleAndTx" preserve="1">
   <p:cSld name="Vertical Title and Text">
     <p:spTree>
@@ -658,9 +900,9 @@
           <a:bodyPr/>
           <a:lstStyle/>
           <a:p>
-            <a:fld id="{8B038832-51DE-4940-9CEC-CF717FE6CECB}" type="datetimeFigureOut">
-              <a:rPr lang="en-US" smtClean="0"/>
-              <a:t>3/23/2024</a:t>
+            <a:fld id="{E8776AC1-21BA-4742-907D-CF3A5A7F771C}" type="datetime1">
+              <a:rPr lang="de-DE" smtClean="0"/>
+              <a:t>24.03.2024</a:t>
             </a:fld>
             <a:endParaRPr lang="en-US"/>
           </a:p>
@@ -856,9 +1098,9 @@
           <a:bodyPr/>
           <a:lstStyle/>
           <a:p>
-            <a:fld id="{8B038832-51DE-4940-9CEC-CF717FE6CECB}" type="datetimeFigureOut">
-              <a:rPr lang="en-US" smtClean="0"/>
-              <a:t>3/23/2024</a:t>
+            <a:fld id="{89E62C9B-B452-4322-936F-91A12848BB5E}" type="datetime1">
+              <a:rPr lang="de-DE" smtClean="0"/>
+              <a:t>24.03.2024</a:t>
             </a:fld>
             <a:endParaRPr lang="en-US"/>
           </a:p>
@@ -1131,9 +1373,9 @@
           <a:bodyPr/>
           <a:lstStyle/>
           <a:p>
-            <a:fld id="{8B038832-51DE-4940-9CEC-CF717FE6CECB}" type="datetimeFigureOut">
-              <a:rPr lang="en-US" smtClean="0"/>
-              <a:t>3/23/2024</a:t>
+            <a:fld id="{5961E691-AD5D-46F6-9361-588612D53B7A}" type="datetime1">
+              <a:rPr lang="de-DE" smtClean="0"/>
+              <a:t>24.03.2024</a:t>
             </a:fld>
             <a:endParaRPr lang="en-US"/>
           </a:p>
@@ -1396,9 +1638,9 @@
           <a:bodyPr/>
           <a:lstStyle/>
           <a:p>
-            <a:fld id="{8B038832-51DE-4940-9CEC-CF717FE6CECB}" type="datetimeFigureOut">
-              <a:rPr lang="en-US" smtClean="0"/>
-              <a:t>3/23/2024</a:t>
+            <a:fld id="{315BCC09-E684-4A9A-B87A-22B1BBC9075B}" type="datetime1">
+              <a:rPr lang="de-DE" smtClean="0"/>
+              <a:t>24.03.2024</a:t>
             </a:fld>
             <a:endParaRPr lang="en-US"/>
           </a:p>
@@ -1472,418 +1714,6 @@
 </file>
 
 <file path=ppt/slideLayouts/slideLayout5.xml><?xml version="1.0" encoding="utf-8"?>
-<p:sldLayout xmlns:a="http://schemas.openxmlformats.org/drawingml/2006/main" xmlns:r="http://schemas.openxmlformats.org/officeDocument/2006/relationships" xmlns:p="http://schemas.openxmlformats.org/presentationml/2006/main" type="twoTxTwoObj" preserve="1">
-  <p:cSld name="Comparison">
-    <p:spTree>
-      <p:nvGrpSpPr>
-        <p:cNvPr id="1" name=""/>
-        <p:cNvGrpSpPr/>
-        <p:nvPr/>
-      </p:nvGrpSpPr>
-      <p:grpSpPr>
-        <a:xfrm>
-          <a:off x="0" y="0"/>
-          <a:ext cx="0" cy="0"/>
-          <a:chOff x="0" y="0"/>
-          <a:chExt cx="0" cy="0"/>
-        </a:xfrm>
-      </p:grpSpPr>
-      <p:sp>
-        <p:nvSpPr>
-          <p:cNvPr id="2" name="Title 1">
-            <a:extLst>
-              <a:ext uri="{FF2B5EF4-FFF2-40B4-BE49-F238E27FC236}">
-                <a16:creationId xmlns:a16="http://schemas.microsoft.com/office/drawing/2014/main" id="{FD58DE68-CE05-7F7D-8E46-F20913A2AB17}"/>
-              </a:ext>
-            </a:extLst>
-          </p:cNvPr>
-          <p:cNvSpPr>
-            <a:spLocks noGrp="1"/>
-          </p:cNvSpPr>
-          <p:nvPr>
-            <p:ph type="title"/>
-          </p:nvPr>
-        </p:nvSpPr>
-        <p:spPr>
-          <a:xfrm>
-            <a:off x="839788" y="365125"/>
-            <a:ext cx="10515600" cy="1325563"/>
-          </a:xfrm>
-        </p:spPr>
-        <p:txBody>
-          <a:bodyPr/>
-          <a:lstStyle/>
-          <a:p>
-            <a:r>
-              <a:rPr lang="en-US"/>
-              <a:t>Click to edit Master title style</a:t>
-            </a:r>
-          </a:p>
-        </p:txBody>
-      </p:sp>
-      <p:sp>
-        <p:nvSpPr>
-          <p:cNvPr id="3" name="Text Placeholder 2">
-            <a:extLst>
-              <a:ext uri="{FF2B5EF4-FFF2-40B4-BE49-F238E27FC236}">
-                <a16:creationId xmlns:a16="http://schemas.microsoft.com/office/drawing/2014/main" id="{34AF168E-C960-BCB3-74C8-1398ED9D4256}"/>
-              </a:ext>
-            </a:extLst>
-          </p:cNvPr>
-          <p:cNvSpPr>
-            <a:spLocks noGrp="1"/>
-          </p:cNvSpPr>
-          <p:nvPr>
-            <p:ph type="body" idx="1"/>
-          </p:nvPr>
-        </p:nvSpPr>
-        <p:spPr>
-          <a:xfrm>
-            <a:off x="839788" y="1681163"/>
-            <a:ext cx="5157787" cy="823912"/>
-          </a:xfrm>
-        </p:spPr>
-        <p:txBody>
-          <a:bodyPr anchor="b"/>
-          <a:lstStyle>
-            <a:lvl1pPr marL="0" indent="0">
-              <a:buNone/>
-              <a:defRPr sz="2400" b="1"/>
-            </a:lvl1pPr>
-            <a:lvl2pPr marL="457200" indent="0">
-              <a:buNone/>
-              <a:defRPr sz="2000" b="1"/>
-            </a:lvl2pPr>
-            <a:lvl3pPr marL="914400" indent="0">
-              <a:buNone/>
-              <a:defRPr sz="1800" b="1"/>
-            </a:lvl3pPr>
-            <a:lvl4pPr marL="1371600" indent="0">
-              <a:buNone/>
-              <a:defRPr sz="1600" b="1"/>
-            </a:lvl4pPr>
-            <a:lvl5pPr marL="1828800" indent="0">
-              <a:buNone/>
-              <a:defRPr sz="1600" b="1"/>
-            </a:lvl5pPr>
-            <a:lvl6pPr marL="2286000" indent="0">
-              <a:buNone/>
-              <a:defRPr sz="1600" b="1"/>
-            </a:lvl6pPr>
-            <a:lvl7pPr marL="2743200" indent="0">
-              <a:buNone/>
-              <a:defRPr sz="1600" b="1"/>
-            </a:lvl7pPr>
-            <a:lvl8pPr marL="3200400" indent="0">
-              <a:buNone/>
-              <a:defRPr sz="1600" b="1"/>
-            </a:lvl8pPr>
-            <a:lvl9pPr marL="3657600" indent="0">
-              <a:buNone/>
-              <a:defRPr sz="1600" b="1"/>
-            </a:lvl9pPr>
-          </a:lstStyle>
-          <a:p>
-            <a:pPr lvl="0"/>
-            <a:r>
-              <a:rPr lang="en-US"/>
-              <a:t>Click to edit Master text styles</a:t>
-            </a:r>
-          </a:p>
-        </p:txBody>
-      </p:sp>
-      <p:sp>
-        <p:nvSpPr>
-          <p:cNvPr id="4" name="Content Placeholder 3">
-            <a:extLst>
-              <a:ext uri="{FF2B5EF4-FFF2-40B4-BE49-F238E27FC236}">
-                <a16:creationId xmlns:a16="http://schemas.microsoft.com/office/drawing/2014/main" id="{10743C30-6C1A-EDAD-6D37-5852C550BB18}"/>
-              </a:ext>
-            </a:extLst>
-          </p:cNvPr>
-          <p:cNvSpPr>
-            <a:spLocks noGrp="1"/>
-          </p:cNvSpPr>
-          <p:nvPr>
-            <p:ph sz="half" idx="2"/>
-          </p:nvPr>
-        </p:nvSpPr>
-        <p:spPr>
-          <a:xfrm>
-            <a:off x="839788" y="2505075"/>
-            <a:ext cx="5157787" cy="3684588"/>
-          </a:xfrm>
-        </p:spPr>
-        <p:txBody>
-          <a:bodyPr/>
-          <a:lstStyle/>
-          <a:p>
-            <a:pPr lvl="0"/>
-            <a:r>
-              <a:rPr lang="en-US"/>
-              <a:t>Click to edit Master text styles</a:t>
-            </a:r>
-          </a:p>
-          <a:p>
-            <a:pPr lvl="1"/>
-            <a:r>
-              <a:rPr lang="en-US"/>
-              <a:t>Second level</a:t>
-            </a:r>
-          </a:p>
-          <a:p>
-            <a:pPr lvl="2"/>
-            <a:r>
-              <a:rPr lang="en-US"/>
-              <a:t>Third level</a:t>
-            </a:r>
-          </a:p>
-          <a:p>
-            <a:pPr lvl="3"/>
-            <a:r>
-              <a:rPr lang="en-US"/>
-              <a:t>Fourth level</a:t>
-            </a:r>
-          </a:p>
-          <a:p>
-            <a:pPr lvl="4"/>
-            <a:r>
-              <a:rPr lang="en-US"/>
-              <a:t>Fifth level</a:t>
-            </a:r>
-          </a:p>
-        </p:txBody>
-      </p:sp>
-      <p:sp>
-        <p:nvSpPr>
-          <p:cNvPr id="5" name="Text Placeholder 4">
-            <a:extLst>
-              <a:ext uri="{FF2B5EF4-FFF2-40B4-BE49-F238E27FC236}">
-                <a16:creationId xmlns:a16="http://schemas.microsoft.com/office/drawing/2014/main" id="{A3BEC889-0E09-8748-8452-C25E145A88EB}"/>
-              </a:ext>
-            </a:extLst>
-          </p:cNvPr>
-          <p:cNvSpPr>
-            <a:spLocks noGrp="1"/>
-          </p:cNvSpPr>
-          <p:nvPr>
-            <p:ph type="body" sz="quarter" idx="3"/>
-          </p:nvPr>
-        </p:nvSpPr>
-        <p:spPr>
-          <a:xfrm>
-            <a:off x="6172200" y="1681163"/>
-            <a:ext cx="5183188" cy="823912"/>
-          </a:xfrm>
-        </p:spPr>
-        <p:txBody>
-          <a:bodyPr anchor="b"/>
-          <a:lstStyle>
-            <a:lvl1pPr marL="0" indent="0">
-              <a:buNone/>
-              <a:defRPr sz="2400" b="1"/>
-            </a:lvl1pPr>
-            <a:lvl2pPr marL="457200" indent="0">
-              <a:buNone/>
-              <a:defRPr sz="2000" b="1"/>
-            </a:lvl2pPr>
-            <a:lvl3pPr marL="914400" indent="0">
-              <a:buNone/>
-              <a:defRPr sz="1800" b="1"/>
-            </a:lvl3pPr>
-            <a:lvl4pPr marL="1371600" indent="0">
-              <a:buNone/>
-              <a:defRPr sz="1600" b="1"/>
-            </a:lvl4pPr>
-            <a:lvl5pPr marL="1828800" indent="0">
-              <a:buNone/>
-              <a:defRPr sz="1600" b="1"/>
-            </a:lvl5pPr>
-            <a:lvl6pPr marL="2286000" indent="0">
-              <a:buNone/>
-              <a:defRPr sz="1600" b="1"/>
-            </a:lvl6pPr>
-            <a:lvl7pPr marL="2743200" indent="0">
-              <a:buNone/>
-              <a:defRPr sz="1600" b="1"/>
-            </a:lvl7pPr>
-            <a:lvl8pPr marL="3200400" indent="0">
-              <a:buNone/>
-              <a:defRPr sz="1600" b="1"/>
-            </a:lvl8pPr>
-            <a:lvl9pPr marL="3657600" indent="0">
-              <a:buNone/>
-              <a:defRPr sz="1600" b="1"/>
-            </a:lvl9pPr>
-          </a:lstStyle>
-          <a:p>
-            <a:pPr lvl="0"/>
-            <a:r>
-              <a:rPr lang="en-US"/>
-              <a:t>Click to edit Master text styles</a:t>
-            </a:r>
-          </a:p>
-        </p:txBody>
-      </p:sp>
-      <p:sp>
-        <p:nvSpPr>
-          <p:cNvPr id="6" name="Content Placeholder 5">
-            <a:extLst>
-              <a:ext uri="{FF2B5EF4-FFF2-40B4-BE49-F238E27FC236}">
-                <a16:creationId xmlns:a16="http://schemas.microsoft.com/office/drawing/2014/main" id="{A9FD3A66-09FF-FBC0-423A-20AC3262919D}"/>
-              </a:ext>
-            </a:extLst>
-          </p:cNvPr>
-          <p:cNvSpPr>
-            <a:spLocks noGrp="1"/>
-          </p:cNvSpPr>
-          <p:nvPr>
-            <p:ph sz="quarter" idx="4"/>
-          </p:nvPr>
-        </p:nvSpPr>
-        <p:spPr>
-          <a:xfrm>
-            <a:off x="6172200" y="2505075"/>
-            <a:ext cx="5183188" cy="3684588"/>
-          </a:xfrm>
-        </p:spPr>
-        <p:txBody>
-          <a:bodyPr/>
-          <a:lstStyle/>
-          <a:p>
-            <a:pPr lvl="0"/>
-            <a:r>
-              <a:rPr lang="en-US"/>
-              <a:t>Click to edit Master text styles</a:t>
-            </a:r>
-          </a:p>
-          <a:p>
-            <a:pPr lvl="1"/>
-            <a:r>
-              <a:rPr lang="en-US"/>
-              <a:t>Second level</a:t>
-            </a:r>
-          </a:p>
-          <a:p>
-            <a:pPr lvl="2"/>
-            <a:r>
-              <a:rPr lang="en-US"/>
-              <a:t>Third level</a:t>
-            </a:r>
-          </a:p>
-          <a:p>
-            <a:pPr lvl="3"/>
-            <a:r>
-              <a:rPr lang="en-US"/>
-              <a:t>Fourth level</a:t>
-            </a:r>
-          </a:p>
-          <a:p>
-            <a:pPr lvl="4"/>
-            <a:r>
-              <a:rPr lang="en-US"/>
-              <a:t>Fifth level</a:t>
-            </a:r>
-          </a:p>
-        </p:txBody>
-      </p:sp>
-      <p:sp>
-        <p:nvSpPr>
-          <p:cNvPr id="7" name="Date Placeholder 6">
-            <a:extLst>
-              <a:ext uri="{FF2B5EF4-FFF2-40B4-BE49-F238E27FC236}">
-                <a16:creationId xmlns:a16="http://schemas.microsoft.com/office/drawing/2014/main" id="{9AAEEA9F-0438-0F22-C912-45AB9D9B10F3}"/>
-              </a:ext>
-            </a:extLst>
-          </p:cNvPr>
-          <p:cNvSpPr>
-            <a:spLocks noGrp="1"/>
-          </p:cNvSpPr>
-          <p:nvPr>
-            <p:ph type="dt" sz="half" idx="10"/>
-          </p:nvPr>
-        </p:nvSpPr>
-        <p:spPr/>
-        <p:txBody>
-          <a:bodyPr/>
-          <a:lstStyle/>
-          <a:p>
-            <a:fld id="{8B038832-51DE-4940-9CEC-CF717FE6CECB}" type="datetimeFigureOut">
-              <a:rPr lang="en-US" smtClean="0"/>
-              <a:t>3/23/2024</a:t>
-            </a:fld>
-            <a:endParaRPr lang="en-US"/>
-          </a:p>
-        </p:txBody>
-      </p:sp>
-      <p:sp>
-        <p:nvSpPr>
-          <p:cNvPr id="8" name="Footer Placeholder 7">
-            <a:extLst>
-              <a:ext uri="{FF2B5EF4-FFF2-40B4-BE49-F238E27FC236}">
-                <a16:creationId xmlns:a16="http://schemas.microsoft.com/office/drawing/2014/main" id="{8C83BD61-BCBF-BA99-9BAD-5081DB55F9C6}"/>
-              </a:ext>
-            </a:extLst>
-          </p:cNvPr>
-          <p:cNvSpPr>
-            <a:spLocks noGrp="1"/>
-          </p:cNvSpPr>
-          <p:nvPr>
-            <p:ph type="ftr" sz="quarter" idx="11"/>
-          </p:nvPr>
-        </p:nvSpPr>
-        <p:spPr/>
-        <p:txBody>
-          <a:bodyPr/>
-          <a:lstStyle/>
-          <a:p>
-            <a:endParaRPr lang="en-US"/>
-          </a:p>
-        </p:txBody>
-      </p:sp>
-      <p:sp>
-        <p:nvSpPr>
-          <p:cNvPr id="9" name="Slide Number Placeholder 8">
-            <a:extLst>
-              <a:ext uri="{FF2B5EF4-FFF2-40B4-BE49-F238E27FC236}">
-                <a16:creationId xmlns:a16="http://schemas.microsoft.com/office/drawing/2014/main" id="{1755F939-507A-1A96-C5DE-59B0BF29F6D6}"/>
-              </a:ext>
-            </a:extLst>
-          </p:cNvPr>
-          <p:cNvSpPr>
-            <a:spLocks noGrp="1"/>
-          </p:cNvSpPr>
-          <p:nvPr>
-            <p:ph type="sldNum" sz="quarter" idx="12"/>
-          </p:nvPr>
-        </p:nvSpPr>
-        <p:spPr/>
-        <p:txBody>
-          <a:bodyPr/>
-          <a:lstStyle/>
-          <a:p>
-            <a:fld id="{DDE4B26F-E58A-4C83-9619-68F81596DFD8}" type="slidenum">
-              <a:rPr lang="en-US" smtClean="0"/>
-              <a:t>‹#›</a:t>
-            </a:fld>
-            <a:endParaRPr lang="en-US"/>
-          </a:p>
-        </p:txBody>
-      </p:sp>
-    </p:spTree>
-    <p:extLst>
-      <p:ext uri="{BB962C8B-B14F-4D97-AF65-F5344CB8AC3E}">
-        <p14:creationId xmlns:p14="http://schemas.microsoft.com/office/powerpoint/2010/main" val="2112660588"/>
-      </p:ext>
-    </p:extLst>
-  </p:cSld>
-  <p:clrMapOvr>
-    <a:masterClrMapping/>
-  </p:clrMapOvr>
-</p:sldLayout>
-</file>
-
-<file path=ppt/slideLayouts/slideLayout6.xml><?xml version="1.0" encoding="utf-8"?>
 <p:sldLayout xmlns:a="http://schemas.openxmlformats.org/drawingml/2006/main" xmlns:r="http://schemas.openxmlformats.org/officeDocument/2006/relationships" xmlns:p="http://schemas.openxmlformats.org/presentationml/2006/main" type="titleOnly" preserve="1">
   <p:cSld name="Title Only">
     <p:spTree>
@@ -1949,9 +1779,9 @@
           <a:bodyPr/>
           <a:lstStyle/>
           <a:p>
-            <a:fld id="{8B038832-51DE-4940-9CEC-CF717FE6CECB}" type="datetimeFigureOut">
-              <a:rPr lang="en-US" smtClean="0"/>
-              <a:t>3/23/2024</a:t>
+            <a:fld id="{275A2FA2-BCD0-4233-AECD-5E2831B6880F}" type="datetime1">
+              <a:rPr lang="de-DE" smtClean="0"/>
+              <a:t>24.03.2024</a:t>
             </a:fld>
             <a:endParaRPr lang="en-US"/>
           </a:p>
@@ -2024,7 +1854,7 @@
 </p:sldLayout>
 </file>
 
-<file path=ppt/slideLayouts/slideLayout7.xml><?xml version="1.0" encoding="utf-8"?>
+<file path=ppt/slideLayouts/slideLayout6.xml><?xml version="1.0" encoding="utf-8"?>
 <p:sldLayout xmlns:a="http://schemas.openxmlformats.org/drawingml/2006/main" xmlns:r="http://schemas.openxmlformats.org/officeDocument/2006/relationships" xmlns:p="http://schemas.openxmlformats.org/presentationml/2006/main" type="blank" preserve="1">
   <p:cSld name="Blank">
     <p:spTree>
@@ -2062,9 +1892,9 @@
           <a:bodyPr/>
           <a:lstStyle/>
           <a:p>
-            <a:fld id="{8B038832-51DE-4940-9CEC-CF717FE6CECB}" type="datetimeFigureOut">
-              <a:rPr lang="en-US" smtClean="0"/>
-              <a:t>3/23/2024</a:t>
+            <a:fld id="{F8293967-2CBE-4645-A866-132B7771F90B}" type="datetime1">
+              <a:rPr lang="de-DE" smtClean="0"/>
+              <a:t>24.03.2024</a:t>
             </a:fld>
             <a:endParaRPr lang="en-US"/>
           </a:p>
@@ -2137,7 +1967,7 @@
 </p:sldLayout>
 </file>
 
-<file path=ppt/slideLayouts/slideLayout8.xml><?xml version="1.0" encoding="utf-8"?>
+<file path=ppt/slideLayouts/slideLayout7.xml><?xml version="1.0" encoding="utf-8"?>
 <p:sldLayout xmlns:a="http://schemas.openxmlformats.org/drawingml/2006/main" xmlns:r="http://schemas.openxmlformats.org/officeDocument/2006/relationships" xmlns:p="http://schemas.openxmlformats.org/presentationml/2006/main" type="objTx" preserve="1">
   <p:cSld name="Content with Caption">
     <p:spTree>
@@ -2373,9 +2203,9 @@
           <a:bodyPr/>
           <a:lstStyle/>
           <a:p>
-            <a:fld id="{8B038832-51DE-4940-9CEC-CF717FE6CECB}" type="datetimeFigureOut">
-              <a:rPr lang="en-US" smtClean="0"/>
-              <a:t>3/23/2024</a:t>
+            <a:fld id="{77B23578-1DEB-473B-B0A3-161EEE3BB63C}" type="datetime1">
+              <a:rPr lang="de-DE" smtClean="0"/>
+              <a:t>24.03.2024</a:t>
             </a:fld>
             <a:endParaRPr lang="en-US"/>
           </a:p>
@@ -2448,7 +2278,7 @@
 </p:sldLayout>
 </file>
 
-<file path=ppt/slideLayouts/slideLayout9.xml><?xml version="1.0" encoding="utf-8"?>
+<file path=ppt/slideLayouts/slideLayout8.xml><?xml version="1.0" encoding="utf-8"?>
 <p:sldLayout xmlns:a="http://schemas.openxmlformats.org/drawingml/2006/main" xmlns:r="http://schemas.openxmlformats.org/officeDocument/2006/relationships" xmlns:p="http://schemas.openxmlformats.org/presentationml/2006/main" type="picTx" preserve="1">
   <p:cSld name="Picture with Caption">
     <p:spTree>
@@ -2661,9 +2491,9 @@
           <a:bodyPr/>
           <a:lstStyle/>
           <a:p>
-            <a:fld id="{8B038832-51DE-4940-9CEC-CF717FE6CECB}" type="datetimeFigureOut">
-              <a:rPr lang="en-US" smtClean="0"/>
-              <a:t>3/23/2024</a:t>
+            <a:fld id="{89B1BDEE-E523-43B3-B9C9-FEB1E809D42E}" type="datetime1">
+              <a:rPr lang="de-DE" smtClean="0"/>
+              <a:t>24.03.2024</a:t>
             </a:fld>
             <a:endParaRPr lang="en-US"/>
           </a:p>
@@ -2727,6 +2557,204 @@
     <p:extLst>
       <p:ext uri="{BB962C8B-B14F-4D97-AF65-F5344CB8AC3E}">
         <p14:creationId xmlns:p14="http://schemas.microsoft.com/office/powerpoint/2010/main" val="3121764343"/>
+      </p:ext>
+    </p:extLst>
+  </p:cSld>
+  <p:clrMapOvr>
+    <a:masterClrMapping/>
+  </p:clrMapOvr>
+</p:sldLayout>
+</file>
+
+<file path=ppt/slideLayouts/slideLayout9.xml><?xml version="1.0" encoding="utf-8"?>
+<p:sldLayout xmlns:a="http://schemas.openxmlformats.org/drawingml/2006/main" xmlns:r="http://schemas.openxmlformats.org/officeDocument/2006/relationships" xmlns:p="http://schemas.openxmlformats.org/presentationml/2006/main" type="vertTx" preserve="1">
+  <p:cSld name="Title and Vertical Text">
+    <p:spTree>
+      <p:nvGrpSpPr>
+        <p:cNvPr id="1" name=""/>
+        <p:cNvGrpSpPr/>
+        <p:nvPr/>
+      </p:nvGrpSpPr>
+      <p:grpSpPr>
+        <a:xfrm>
+          <a:off x="0" y="0"/>
+          <a:ext cx="0" cy="0"/>
+          <a:chOff x="0" y="0"/>
+          <a:chExt cx="0" cy="0"/>
+        </a:xfrm>
+      </p:grpSpPr>
+      <p:sp>
+        <p:nvSpPr>
+          <p:cNvPr id="2" name="Title 1">
+            <a:extLst>
+              <a:ext uri="{FF2B5EF4-FFF2-40B4-BE49-F238E27FC236}">
+                <a16:creationId xmlns:a16="http://schemas.microsoft.com/office/drawing/2014/main" id="{3DA5E5BC-2058-F485-9D41-ED91BECFA4ED}"/>
+              </a:ext>
+            </a:extLst>
+          </p:cNvPr>
+          <p:cNvSpPr>
+            <a:spLocks noGrp="1"/>
+          </p:cNvSpPr>
+          <p:nvPr>
+            <p:ph type="title"/>
+          </p:nvPr>
+        </p:nvSpPr>
+        <p:spPr/>
+        <p:txBody>
+          <a:bodyPr/>
+          <a:lstStyle/>
+          <a:p>
+            <a:r>
+              <a:rPr lang="en-US"/>
+              <a:t>Click to edit Master title style</a:t>
+            </a:r>
+          </a:p>
+        </p:txBody>
+      </p:sp>
+      <p:sp>
+        <p:nvSpPr>
+          <p:cNvPr id="3" name="Vertical Text Placeholder 2">
+            <a:extLst>
+              <a:ext uri="{FF2B5EF4-FFF2-40B4-BE49-F238E27FC236}">
+                <a16:creationId xmlns:a16="http://schemas.microsoft.com/office/drawing/2014/main" id="{1634B8C4-5FA2-D698-F368-4D8B4ADDFCDE}"/>
+              </a:ext>
+            </a:extLst>
+          </p:cNvPr>
+          <p:cNvSpPr>
+            <a:spLocks noGrp="1"/>
+          </p:cNvSpPr>
+          <p:nvPr>
+            <p:ph type="body" orient="vert" idx="1"/>
+          </p:nvPr>
+        </p:nvSpPr>
+        <p:spPr/>
+        <p:txBody>
+          <a:bodyPr vert="eaVert"/>
+          <a:lstStyle/>
+          <a:p>
+            <a:pPr lvl="0"/>
+            <a:r>
+              <a:rPr lang="en-US"/>
+              <a:t>Click to edit Master text styles</a:t>
+            </a:r>
+          </a:p>
+          <a:p>
+            <a:pPr lvl="1"/>
+            <a:r>
+              <a:rPr lang="en-US"/>
+              <a:t>Second level</a:t>
+            </a:r>
+          </a:p>
+          <a:p>
+            <a:pPr lvl="2"/>
+            <a:r>
+              <a:rPr lang="en-US"/>
+              <a:t>Third level</a:t>
+            </a:r>
+          </a:p>
+          <a:p>
+            <a:pPr lvl="3"/>
+            <a:r>
+              <a:rPr lang="en-US"/>
+              <a:t>Fourth level</a:t>
+            </a:r>
+          </a:p>
+          <a:p>
+            <a:pPr lvl="4"/>
+            <a:r>
+              <a:rPr lang="en-US"/>
+              <a:t>Fifth level</a:t>
+            </a:r>
+          </a:p>
+        </p:txBody>
+      </p:sp>
+      <p:sp>
+        <p:nvSpPr>
+          <p:cNvPr id="4" name="Date Placeholder 3">
+            <a:extLst>
+              <a:ext uri="{FF2B5EF4-FFF2-40B4-BE49-F238E27FC236}">
+                <a16:creationId xmlns:a16="http://schemas.microsoft.com/office/drawing/2014/main" id="{23A2A7CA-3FF6-C57C-976F-9F50E660C17C}"/>
+              </a:ext>
+            </a:extLst>
+          </p:cNvPr>
+          <p:cNvSpPr>
+            <a:spLocks noGrp="1"/>
+          </p:cNvSpPr>
+          <p:nvPr>
+            <p:ph type="dt" sz="half" idx="10"/>
+          </p:nvPr>
+        </p:nvSpPr>
+        <p:spPr/>
+        <p:txBody>
+          <a:bodyPr/>
+          <a:lstStyle/>
+          <a:p>
+            <a:fld id="{D6F43DCC-D1A6-4C4E-93A6-2648B6E26C6C}" type="datetime1">
+              <a:rPr lang="de-DE" smtClean="0"/>
+              <a:t>24.03.2024</a:t>
+            </a:fld>
+            <a:endParaRPr lang="en-US"/>
+          </a:p>
+        </p:txBody>
+      </p:sp>
+      <p:sp>
+        <p:nvSpPr>
+          <p:cNvPr id="5" name="Footer Placeholder 4">
+            <a:extLst>
+              <a:ext uri="{FF2B5EF4-FFF2-40B4-BE49-F238E27FC236}">
+                <a16:creationId xmlns:a16="http://schemas.microsoft.com/office/drawing/2014/main" id="{615CDE6D-A9E9-9445-D3D3-5F040A510AB2}"/>
+              </a:ext>
+            </a:extLst>
+          </p:cNvPr>
+          <p:cNvSpPr>
+            <a:spLocks noGrp="1"/>
+          </p:cNvSpPr>
+          <p:nvPr>
+            <p:ph type="ftr" sz="quarter" idx="11"/>
+          </p:nvPr>
+        </p:nvSpPr>
+        <p:spPr/>
+        <p:txBody>
+          <a:bodyPr/>
+          <a:lstStyle/>
+          <a:p>
+            <a:endParaRPr lang="en-US"/>
+          </a:p>
+        </p:txBody>
+      </p:sp>
+      <p:sp>
+        <p:nvSpPr>
+          <p:cNvPr id="6" name="Slide Number Placeholder 5">
+            <a:extLst>
+              <a:ext uri="{FF2B5EF4-FFF2-40B4-BE49-F238E27FC236}">
+                <a16:creationId xmlns:a16="http://schemas.microsoft.com/office/drawing/2014/main" id="{ACE73FED-9719-E623-BA4A-25861D13FED0}"/>
+              </a:ext>
+            </a:extLst>
+          </p:cNvPr>
+          <p:cNvSpPr>
+            <a:spLocks noGrp="1"/>
+          </p:cNvSpPr>
+          <p:nvPr>
+            <p:ph type="sldNum" sz="quarter" idx="12"/>
+          </p:nvPr>
+        </p:nvSpPr>
+        <p:spPr/>
+        <p:txBody>
+          <a:bodyPr/>
+          <a:lstStyle/>
+          <a:p>
+            <a:fld id="{DDE4B26F-E58A-4C83-9619-68F81596DFD8}" type="slidenum">
+              <a:rPr lang="en-US" smtClean="0"/>
+              <a:t>‹#›</a:t>
+            </a:fld>
+            <a:endParaRPr lang="en-US"/>
+          </a:p>
+        </p:txBody>
+      </p:sp>
+    </p:spTree>
+    <p:extLst>
+      <p:ext uri="{BB962C8B-B14F-4D97-AF65-F5344CB8AC3E}">
+        <p14:creationId xmlns:p14="http://schemas.microsoft.com/office/powerpoint/2010/main" val="1866038492"/>
       </p:ext>
     </p:extLst>
   </p:cSld>
@@ -2902,9 +2930,9 @@
             </a:lvl1pPr>
           </a:lstStyle>
           <a:p>
-            <a:fld id="{8B038832-51DE-4940-9CEC-CF717FE6CECB}" type="datetimeFigureOut">
-              <a:rPr lang="en-US" smtClean="0"/>
-              <a:t>3/23/2024</a:t>
+            <a:fld id="{17238E1B-53C2-4454-A9E1-2A21AAF129EB}" type="datetime1">
+              <a:rPr lang="de-DE" smtClean="0"/>
+              <a:t>24.03.2024</a:t>
             </a:fld>
             <a:endParaRPr lang="en-US"/>
           </a:p>
@@ -3013,14 +3041,14 @@
     <p:sldLayoutId id="2147483650" r:id="rId2"/>
     <p:sldLayoutId id="2147483651" r:id="rId3"/>
     <p:sldLayoutId id="2147483652" r:id="rId4"/>
-    <p:sldLayoutId id="2147483653" r:id="rId5"/>
-    <p:sldLayoutId id="2147483654" r:id="rId6"/>
-    <p:sldLayoutId id="2147483655" r:id="rId7"/>
-    <p:sldLayoutId id="2147483656" r:id="rId8"/>
-    <p:sldLayoutId id="2147483657" r:id="rId9"/>
-    <p:sldLayoutId id="2147483658" r:id="rId10"/>
-    <p:sldLayoutId id="2147483659" r:id="rId11"/>
+    <p:sldLayoutId id="2147483654" r:id="rId5"/>
+    <p:sldLayoutId id="2147483655" r:id="rId6"/>
+    <p:sldLayoutId id="2147483656" r:id="rId7"/>
+    <p:sldLayoutId id="2147483657" r:id="rId8"/>
+    <p:sldLayoutId id="2147483658" r:id="rId9"/>
+    <p:sldLayoutId id="2147483659" r:id="rId10"/>
   </p:sldLayoutIdLst>
+  <p:hf hdr="0" ftr="0"/>
   <p:txStyles>
     <p:titleStyle>
       <a:lvl1pPr algn="l" defTabSz="914400" rtl="0" eaLnBrk="1" latinLnBrk="0" hangingPunct="1">
@@ -3337,25 +3365,98 @@
             <p:ph type="ctrTitle"/>
           </p:nvPr>
         </p:nvSpPr>
-        <p:spPr/>
+        <p:spPr>
+          <a:xfrm>
+            <a:off x="723899" y="781659"/>
+            <a:ext cx="9705975" cy="2387600"/>
+          </a:xfrm>
+        </p:spPr>
         <p:txBody>
           <a:bodyPr>
             <a:normAutofit/>
           </a:bodyPr>
           <a:lstStyle/>
           <a:p>
-            <a:r>
-              <a:rPr lang="en-US" dirty="0"/>
-              <a:t>Implement the KNN Classifier </a:t>
-            </a:r>
-            <a:r>
-              <a:rPr lang="en-US" sz="1400" dirty="0"/>
-              <a:t>(Team KNN Quest)</a:t>
-            </a:r>
-            <a:endParaRPr lang="en-US" dirty="0"/>
-          </a:p>
-        </p:txBody>
-      </p:sp>
+            <a:pPr algn="l"/>
+            <a:r>
+              <a:rPr lang="en-US" sz="2400" dirty="0">
+                <a:latin typeface="Arial Rounded MT Bold" panose="020F0704030504030204" pitchFamily="34" charset="0"/>
+              </a:rPr>
+              <a:t>Module: Software Engineering </a:t>
+            </a:r>
+            <a:br>
+              <a:rPr lang="en-US" sz="4000" dirty="0">
+                <a:latin typeface="Arial Rounded MT Bold" panose="020F0704030504030204" pitchFamily="34" charset="0"/>
+              </a:rPr>
+            </a:br>
+            <a:br>
+              <a:rPr lang="en-US" sz="4000" dirty="0">
+                <a:latin typeface="Arial Rounded MT Bold" panose="020F0704030504030204" pitchFamily="34" charset="0"/>
+              </a:rPr>
+            </a:br>
+            <a:r>
+              <a:rPr lang="en-US" sz="4000" dirty="0">
+                <a:latin typeface="Arial Rounded MT Bold" panose="020F0704030504030204" pitchFamily="34" charset="0"/>
+              </a:rPr>
+              <a:t>Project: Implement the KNN Classifier</a:t>
+            </a:r>
+          </a:p>
+        </p:txBody>
+      </p:sp>
+      <p:pic>
+        <p:nvPicPr>
+          <p:cNvPr id="1026" name="Picture 2" descr="Frankfurt University of Applied Sciences (@FrankfurtUAS) / X">
+            <a:extLst>
+              <a:ext uri="{FF2B5EF4-FFF2-40B4-BE49-F238E27FC236}">
+                <a16:creationId xmlns:a16="http://schemas.microsoft.com/office/drawing/2014/main" id="{4D614738-9ECD-EF1D-7E8A-80BC3153F342}"/>
+              </a:ext>
+            </a:extLst>
+          </p:cNvPr>
+          <p:cNvPicPr>
+            <a:picLocks noChangeAspect="1" noChangeArrowheads="1"/>
+          </p:cNvPicPr>
+          <p:nvPr/>
+        </p:nvPicPr>
+        <p:blipFill rotWithShape="1">
+          <a:blip r:embed="rId2">
+            <a:extLst>
+              <a:ext uri="{BEBA8EAE-BF5A-486C-A8C5-ECC9F3942E4B}">
+                <a14:imgProps xmlns:a14="http://schemas.microsoft.com/office/drawing/2010/main">
+                  <a14:imgLayer r:embed="rId3">
+                    <a14:imgEffect>
+                      <a14:brightnessContrast contrast="-3000"/>
+                    </a14:imgEffect>
+                  </a14:imgLayer>
+                </a14:imgProps>
+              </a:ext>
+              <a:ext uri="{28A0092B-C50C-407E-A947-70E740481C1C}">
+                <a14:useLocalDpi xmlns:a14="http://schemas.microsoft.com/office/drawing/2010/main" val="0"/>
+              </a:ext>
+            </a:extLst>
+          </a:blip>
+          <a:srcRect t="26761" b="26161"/>
+          <a:stretch/>
+        </p:blipFill>
+        <p:spPr bwMode="auto">
+          <a:xfrm>
+            <a:off x="10209586" y="19458"/>
+            <a:ext cx="1962958" cy="924127"/>
+          </a:xfrm>
+          <a:prstGeom prst="rect">
+            <a:avLst/>
+          </a:prstGeom>
+          <a:noFill/>
+          <a:extLst>
+            <a:ext uri="{909E8E84-426E-40DD-AFC4-6F175D3DCCD1}">
+              <a14:hiddenFill xmlns:a14="http://schemas.microsoft.com/office/drawing/2010/main">
+                <a:solidFill>
+                  <a:srgbClr val="FFFFFF"/>
+                </a:solidFill>
+              </a14:hiddenFill>
+            </a:ext>
+          </a:extLst>
+        </p:spPr>
+      </p:pic>
       <p:sp>
         <p:nvSpPr>
           <p:cNvPr id="3" name="Subtitle 2">
@@ -3374,43 +3475,153 @@
         </p:nvSpPr>
         <p:spPr>
           <a:xfrm>
-            <a:off x="1524000" y="4240213"/>
-            <a:ext cx="9144000" cy="1655762"/>
+            <a:off x="723899" y="3352799"/>
+            <a:ext cx="9424987" cy="2924175"/>
           </a:xfrm>
         </p:spPr>
         <p:txBody>
           <a:bodyPr>
-            <a:normAutofit fontScale="92500" lnSpcReduction="10000"/>
+            <a:noAutofit/>
           </a:bodyPr>
           <a:lstStyle/>
           <a:p>
-            <a:r>
-              <a:rPr lang="en-US" sz="3300" dirty="0">
+            <a:endParaRPr lang="en-US" sz="1600" dirty="0">
+              <a:solidFill>
+                <a:srgbClr val="002060"/>
+              </a:solidFill>
+              <a:latin typeface="Arial Rounded MT Bold" panose="020F0704030504030204" pitchFamily="34" charset="0"/>
+            </a:endParaRPr>
+          </a:p>
+          <a:p>
+            <a:endParaRPr lang="en-US" sz="1600" dirty="0">
+              <a:solidFill>
+                <a:srgbClr val="002060"/>
+              </a:solidFill>
+              <a:latin typeface="Arial Rounded MT Bold" panose="020F0704030504030204" pitchFamily="34" charset="0"/>
+            </a:endParaRPr>
+          </a:p>
+          <a:p>
+            <a:r>
+              <a:rPr lang="en-US" sz="1600" dirty="0">
                 <a:solidFill>
                   <a:srgbClr val="002060"/>
                 </a:solidFill>
+                <a:latin typeface="Arial Rounded MT Bold" panose="020F0704030504030204" pitchFamily="34" charset="0"/>
               </a:rPr>
-              <a:t>Team members:</a:t>
-            </a:r>
+              <a:t>Presented by KNN Quest:</a:t>
+            </a:r>
+          </a:p>
+          <a:p>
             <a:br>
-              <a:rPr lang="en-US" dirty="0"/>
+              <a:rPr lang="en-US" sz="1600" dirty="0">
+                <a:latin typeface="Arial Rounded MT Bold" panose="020F0704030504030204" pitchFamily="34" charset="0"/>
+              </a:rPr>
             </a:br>
             <a:r>
-              <a:rPr lang="en-US" dirty="0"/>
-              <a:t>Kashif Hussain</a:t>
-            </a:r>
-          </a:p>
-          <a:p>
-            <a:r>
-              <a:rPr lang="en-US" dirty="0"/>
-              <a:t>Fahad Jabbar</a:t>
-            </a:r>
-          </a:p>
-          <a:p>
-            <a:r>
-              <a:rPr lang="en-US" dirty="0"/>
-              <a:t>Naila Shaheen</a:t>
-            </a:r>
+              <a:rPr lang="en-US" sz="1600" dirty="0">
+                <a:latin typeface="Arial Rounded MT Bold" panose="020F0704030504030204" pitchFamily="34" charset="0"/>
+              </a:rPr>
+              <a:t>Kashif Hussain – </a:t>
+            </a:r>
+          </a:p>
+          <a:p>
+            <a:r>
+              <a:rPr lang="en-US" sz="1600" dirty="0">
+                <a:latin typeface="Arial Rounded MT Bold" panose="020F0704030504030204" pitchFamily="34" charset="0"/>
+              </a:rPr>
+              <a:t>Fahad Jabbar – </a:t>
+            </a:r>
+          </a:p>
+          <a:p>
+            <a:r>
+              <a:rPr lang="en-US" sz="1600" dirty="0">
+                <a:latin typeface="Arial Rounded MT Bold" panose="020F0704030504030204" pitchFamily="34" charset="0"/>
+              </a:rPr>
+              <a:t>Naila Shaheen –</a:t>
+            </a:r>
+          </a:p>
+          <a:p>
+            <a:r>
+              <a:rPr lang="en-US" sz="1600" dirty="0">
+                <a:latin typeface="Arial Rounded MT Bold" panose="020F0704030504030204" pitchFamily="34" charset="0"/>
+              </a:rPr>
+              <a:t>                                                        </a:t>
+            </a:r>
+          </a:p>
+          <a:p>
+            <a:r>
+              <a:rPr lang="en-US" sz="1600" dirty="0">
+                <a:latin typeface="Arial Rounded MT Bold" panose="020F0704030504030204" pitchFamily="34" charset="0"/>
+              </a:rPr>
+              <a:t>Guided by: Prof. Dr. Damir </a:t>
+            </a:r>
+            <a:r>
+              <a:rPr lang="en-US" sz="1600" dirty="0" err="1">
+                <a:latin typeface="Arial Rounded MT Bold" panose="020F0704030504030204" pitchFamily="34" charset="0"/>
+              </a:rPr>
+              <a:t>Dobric</a:t>
+            </a:r>
+            <a:endParaRPr lang="en-US" sz="1600" dirty="0">
+              <a:latin typeface="Arial Rounded MT Bold" panose="020F0704030504030204" pitchFamily="34" charset="0"/>
+            </a:endParaRPr>
+          </a:p>
+        </p:txBody>
+      </p:sp>
+      <p:sp>
+        <p:nvSpPr>
+          <p:cNvPr id="4" name="Date Placeholder 3">
+            <a:extLst>
+              <a:ext uri="{FF2B5EF4-FFF2-40B4-BE49-F238E27FC236}">
+                <a16:creationId xmlns:a16="http://schemas.microsoft.com/office/drawing/2014/main" id="{B56A32D8-A099-9B57-49B0-1828DBA433D5}"/>
+              </a:ext>
+            </a:extLst>
+          </p:cNvPr>
+          <p:cNvSpPr>
+            <a:spLocks noGrp="1"/>
+          </p:cNvSpPr>
+          <p:nvPr>
+            <p:ph type="dt" sz="half" idx="10"/>
+          </p:nvPr>
+        </p:nvSpPr>
+        <p:spPr/>
+        <p:txBody>
+          <a:bodyPr/>
+          <a:lstStyle/>
+          <a:p>
+            <a:fld id="{417A8112-CFF2-4B2D-A30A-AD3542D64B74}" type="datetime1">
+              <a:rPr lang="de-DE" smtClean="0"/>
+              <a:t>24.03.2024</a:t>
+            </a:fld>
+            <a:endParaRPr lang="en-US" dirty="0"/>
+          </a:p>
+        </p:txBody>
+      </p:sp>
+      <p:sp>
+        <p:nvSpPr>
+          <p:cNvPr id="5" name="Slide Number Placeholder 4">
+            <a:extLst>
+              <a:ext uri="{FF2B5EF4-FFF2-40B4-BE49-F238E27FC236}">
+                <a16:creationId xmlns:a16="http://schemas.microsoft.com/office/drawing/2014/main" id="{638376B8-0865-F5E5-EF37-C7990AEF3DD7}"/>
+              </a:ext>
+            </a:extLst>
+          </p:cNvPr>
+          <p:cNvSpPr>
+            <a:spLocks noGrp="1"/>
+          </p:cNvSpPr>
+          <p:nvPr>
+            <p:ph type="sldNum" sz="quarter" idx="12"/>
+          </p:nvPr>
+        </p:nvSpPr>
+        <p:spPr/>
+        <p:txBody>
+          <a:bodyPr/>
+          <a:lstStyle/>
+          <a:p>
+            <a:fld id="{DDE4B26F-E58A-4C83-9619-68F81596DFD8}" type="slidenum">
+              <a:rPr lang="en-US" smtClean="0"/>
+              <a:t>1</a:t>
+            </a:fld>
+            <a:endParaRPr lang="en-US" dirty="0"/>
           </a:p>
         </p:txBody>
       </p:sp>
@@ -3418,6 +3629,360 @@
     <p:extLst>
       <p:ext uri="{BB962C8B-B14F-4D97-AF65-F5344CB8AC3E}">
         <p14:creationId xmlns:p14="http://schemas.microsoft.com/office/powerpoint/2010/main" val="2024566905"/>
+      </p:ext>
+    </p:extLst>
+  </p:cSld>
+  <p:clrMapOvr>
+    <a:masterClrMapping/>
+  </p:clrMapOvr>
+</p:sld>
+</file>
+
+<file path=ppt/slides/slide2.xml><?xml version="1.0" encoding="utf-8"?>
+<p:sld xmlns:a="http://schemas.openxmlformats.org/drawingml/2006/main" xmlns:r="http://schemas.openxmlformats.org/officeDocument/2006/relationships" xmlns:p="http://schemas.openxmlformats.org/presentationml/2006/main">
+  <p:cSld>
+    <p:spTree>
+      <p:nvGrpSpPr>
+        <p:cNvPr id="1" name=""/>
+        <p:cNvGrpSpPr/>
+        <p:nvPr/>
+      </p:nvGrpSpPr>
+      <p:grpSpPr>
+        <a:xfrm>
+          <a:off x="0" y="0"/>
+          <a:ext cx="0" cy="0"/>
+          <a:chOff x="0" y="0"/>
+          <a:chExt cx="0" cy="0"/>
+        </a:xfrm>
+      </p:grpSpPr>
+      <p:sp>
+        <p:nvSpPr>
+          <p:cNvPr id="2" name="Title 1">
+            <a:extLst>
+              <a:ext uri="{FF2B5EF4-FFF2-40B4-BE49-F238E27FC236}">
+                <a16:creationId xmlns:a16="http://schemas.microsoft.com/office/drawing/2014/main" id="{6EB4F404-45CF-BEAD-72C5-FAAF4D84D09A}"/>
+              </a:ext>
+            </a:extLst>
+          </p:cNvPr>
+          <p:cNvSpPr>
+            <a:spLocks noGrp="1"/>
+          </p:cNvSpPr>
+          <p:nvPr>
+            <p:ph type="title"/>
+          </p:nvPr>
+        </p:nvSpPr>
+        <p:spPr/>
+        <p:txBody>
+          <a:bodyPr/>
+          <a:lstStyle/>
+          <a:p>
+            <a:r>
+              <a:rPr lang="en-US" dirty="0"/>
+              <a:t>Methodology</a:t>
+            </a:r>
+          </a:p>
+        </p:txBody>
+      </p:sp>
+      <p:sp>
+        <p:nvSpPr>
+          <p:cNvPr id="3" name="Content Placeholder 2">
+            <a:extLst>
+              <a:ext uri="{FF2B5EF4-FFF2-40B4-BE49-F238E27FC236}">
+                <a16:creationId xmlns:a16="http://schemas.microsoft.com/office/drawing/2014/main" id="{CF20EB18-1BC5-7F2D-B706-4F98936B38BC}"/>
+              </a:ext>
+            </a:extLst>
+          </p:cNvPr>
+          <p:cNvSpPr>
+            <a:spLocks noGrp="1"/>
+          </p:cNvSpPr>
+          <p:nvPr>
+            <p:ph idx="1"/>
+          </p:nvPr>
+        </p:nvSpPr>
+        <p:spPr/>
+        <p:txBody>
+          <a:bodyPr>
+            <a:normAutofit/>
+          </a:bodyPr>
+          <a:lstStyle/>
+          <a:p>
+            <a:r>
+              <a:rPr lang="en-US" dirty="0">
+                <a:latin typeface="Pristina" panose="03060402040406080204" pitchFamily="66" charset="0"/>
+              </a:rPr>
+              <a:t>Introduction to KNN Classifier</a:t>
+            </a:r>
+          </a:p>
+          <a:p>
+            <a:r>
+              <a:rPr lang="en-US" dirty="0">
+                <a:latin typeface="Pristina" panose="03060402040406080204" pitchFamily="66" charset="0"/>
+              </a:rPr>
+              <a:t>Implementation of Native KNN classifier</a:t>
+            </a:r>
+          </a:p>
+          <a:p>
+            <a:r>
+              <a:rPr lang="en-US" dirty="0">
+                <a:latin typeface="Pristina" panose="03060402040406080204" pitchFamily="66" charset="0"/>
+              </a:rPr>
+              <a:t>Integration of KNN classifier with </a:t>
+            </a:r>
+            <a:r>
+              <a:rPr lang="en-US" dirty="0" err="1">
+                <a:latin typeface="Pristina" panose="03060402040406080204" pitchFamily="66" charset="0"/>
+              </a:rPr>
+              <a:t>NeocortexAPI</a:t>
+            </a:r>
+            <a:endParaRPr lang="en-US" dirty="0">
+              <a:latin typeface="Pristina" panose="03060402040406080204" pitchFamily="66" charset="0"/>
+            </a:endParaRPr>
+          </a:p>
+          <a:p>
+            <a:r>
+              <a:rPr lang="en-US" dirty="0">
+                <a:latin typeface="Pristina" panose="03060402040406080204" pitchFamily="66" charset="0"/>
+              </a:rPr>
+              <a:t>Implementation of KNN Classifier with Spatial Pooler generated SDRs</a:t>
+            </a:r>
+          </a:p>
+          <a:p>
+            <a:r>
+              <a:rPr lang="en-US" dirty="0">
+                <a:latin typeface="Pristina" panose="03060402040406080204" pitchFamily="66" charset="0"/>
+              </a:rPr>
+              <a:t>Unit testing</a:t>
+            </a:r>
+          </a:p>
+          <a:p>
+            <a:r>
+              <a:rPr lang="en-US" dirty="0">
+                <a:latin typeface="Pristina" panose="03060402040406080204" pitchFamily="66" charset="0"/>
+              </a:rPr>
+              <a:t>Results and Discussion </a:t>
+            </a:r>
+          </a:p>
+          <a:p>
+            <a:r>
+              <a:rPr lang="en-US" dirty="0">
+                <a:latin typeface="Pristina" panose="03060402040406080204" pitchFamily="66" charset="0"/>
+              </a:rPr>
+              <a:t>Conclusion</a:t>
+            </a:r>
+          </a:p>
+          <a:p>
+            <a:r>
+              <a:rPr lang="en-US" dirty="0">
+                <a:latin typeface="Pristina" panose="03060402040406080204" pitchFamily="66" charset="0"/>
+              </a:rPr>
+              <a:t>References</a:t>
+            </a:r>
+          </a:p>
+        </p:txBody>
+      </p:sp>
+      <p:sp>
+        <p:nvSpPr>
+          <p:cNvPr id="4" name="Date Placeholder 3">
+            <a:extLst>
+              <a:ext uri="{FF2B5EF4-FFF2-40B4-BE49-F238E27FC236}">
+                <a16:creationId xmlns:a16="http://schemas.microsoft.com/office/drawing/2014/main" id="{B81C5404-7CE2-CDA9-A411-F6449D2D1C1E}"/>
+              </a:ext>
+            </a:extLst>
+          </p:cNvPr>
+          <p:cNvSpPr>
+            <a:spLocks noGrp="1"/>
+          </p:cNvSpPr>
+          <p:nvPr>
+            <p:ph type="dt" sz="half" idx="10"/>
+          </p:nvPr>
+        </p:nvSpPr>
+        <p:spPr/>
+        <p:txBody>
+          <a:bodyPr/>
+          <a:lstStyle/>
+          <a:p>
+            <a:fld id="{9B2A6F4F-9563-451F-A077-87C68364E6DB}" type="datetime1">
+              <a:rPr lang="de-DE" smtClean="0"/>
+              <a:t>24.03.2024</a:t>
+            </a:fld>
+            <a:endParaRPr lang="en-US"/>
+          </a:p>
+        </p:txBody>
+      </p:sp>
+      <p:sp>
+        <p:nvSpPr>
+          <p:cNvPr id="5" name="Slide Number Placeholder 4">
+            <a:extLst>
+              <a:ext uri="{FF2B5EF4-FFF2-40B4-BE49-F238E27FC236}">
+                <a16:creationId xmlns:a16="http://schemas.microsoft.com/office/drawing/2014/main" id="{BC0F7831-1786-0848-3C46-6B989E64E5D8}"/>
+              </a:ext>
+            </a:extLst>
+          </p:cNvPr>
+          <p:cNvSpPr>
+            <a:spLocks noGrp="1"/>
+          </p:cNvSpPr>
+          <p:nvPr>
+            <p:ph type="sldNum" sz="quarter" idx="12"/>
+          </p:nvPr>
+        </p:nvSpPr>
+        <p:spPr/>
+        <p:txBody>
+          <a:bodyPr/>
+          <a:lstStyle/>
+          <a:p>
+            <a:fld id="{DDE4B26F-E58A-4C83-9619-68F81596DFD8}" type="slidenum">
+              <a:rPr lang="en-US" smtClean="0"/>
+              <a:t>2</a:t>
+            </a:fld>
+            <a:endParaRPr lang="en-US"/>
+          </a:p>
+        </p:txBody>
+      </p:sp>
+    </p:spTree>
+    <p:extLst>
+      <p:ext uri="{BB962C8B-B14F-4D97-AF65-F5344CB8AC3E}">
+        <p14:creationId xmlns:p14="http://schemas.microsoft.com/office/powerpoint/2010/main" val="1694113279"/>
+      </p:ext>
+    </p:extLst>
+  </p:cSld>
+  <p:clrMapOvr>
+    <a:masterClrMapping/>
+  </p:clrMapOvr>
+</p:sld>
+</file>
+
+<file path=ppt/slides/slide3.xml><?xml version="1.0" encoding="utf-8"?>
+<p:sld xmlns:a="http://schemas.openxmlformats.org/drawingml/2006/main" xmlns:r="http://schemas.openxmlformats.org/officeDocument/2006/relationships" xmlns:p="http://schemas.openxmlformats.org/presentationml/2006/main">
+  <p:cSld>
+    <p:spTree>
+      <p:nvGrpSpPr>
+        <p:cNvPr id="1" name=""/>
+        <p:cNvGrpSpPr/>
+        <p:nvPr/>
+      </p:nvGrpSpPr>
+      <p:grpSpPr>
+        <a:xfrm>
+          <a:off x="0" y="0"/>
+          <a:ext cx="0" cy="0"/>
+          <a:chOff x="0" y="0"/>
+          <a:chExt cx="0" cy="0"/>
+        </a:xfrm>
+      </p:grpSpPr>
+      <p:sp>
+        <p:nvSpPr>
+          <p:cNvPr id="2" name="Title 1">
+            <a:extLst>
+              <a:ext uri="{FF2B5EF4-FFF2-40B4-BE49-F238E27FC236}">
+                <a16:creationId xmlns:a16="http://schemas.microsoft.com/office/drawing/2014/main" id="{EB694E28-C329-F6CB-BB96-86AFA608F147}"/>
+              </a:ext>
+            </a:extLst>
+          </p:cNvPr>
+          <p:cNvSpPr>
+            <a:spLocks noGrp="1"/>
+          </p:cNvSpPr>
+          <p:nvPr>
+            <p:ph type="title"/>
+          </p:nvPr>
+        </p:nvSpPr>
+        <p:spPr/>
+        <p:txBody>
+          <a:bodyPr/>
+          <a:lstStyle/>
+          <a:p>
+            <a:r>
+              <a:rPr lang="en-US" dirty="0"/>
+              <a:t>Introduction to KNN Classifier</a:t>
+            </a:r>
+          </a:p>
+        </p:txBody>
+      </p:sp>
+      <p:sp>
+        <p:nvSpPr>
+          <p:cNvPr id="3" name="Content Placeholder 2">
+            <a:extLst>
+              <a:ext uri="{FF2B5EF4-FFF2-40B4-BE49-F238E27FC236}">
+                <a16:creationId xmlns:a16="http://schemas.microsoft.com/office/drawing/2014/main" id="{E7F35339-F8DC-5FAD-AA18-0D97C8B06AAD}"/>
+              </a:ext>
+            </a:extLst>
+          </p:cNvPr>
+          <p:cNvSpPr>
+            <a:spLocks noGrp="1"/>
+          </p:cNvSpPr>
+          <p:nvPr>
+            <p:ph idx="1"/>
+          </p:nvPr>
+        </p:nvSpPr>
+        <p:spPr/>
+        <p:txBody>
+          <a:bodyPr/>
+          <a:lstStyle/>
+          <a:p>
+            <a:endParaRPr lang="en-US" dirty="0"/>
+          </a:p>
+        </p:txBody>
+      </p:sp>
+      <p:sp>
+        <p:nvSpPr>
+          <p:cNvPr id="4" name="Date Placeholder 3">
+            <a:extLst>
+              <a:ext uri="{FF2B5EF4-FFF2-40B4-BE49-F238E27FC236}">
+                <a16:creationId xmlns:a16="http://schemas.microsoft.com/office/drawing/2014/main" id="{626597FB-6243-AC61-FD3D-A3473CF69E8D}"/>
+              </a:ext>
+            </a:extLst>
+          </p:cNvPr>
+          <p:cNvSpPr>
+            <a:spLocks noGrp="1"/>
+          </p:cNvSpPr>
+          <p:nvPr>
+            <p:ph type="dt" sz="half" idx="10"/>
+          </p:nvPr>
+        </p:nvSpPr>
+        <p:spPr/>
+        <p:txBody>
+          <a:bodyPr/>
+          <a:lstStyle/>
+          <a:p>
+            <a:fld id="{89E62C9B-B452-4322-936F-91A12848BB5E}" type="datetime1">
+              <a:rPr lang="de-DE" smtClean="0"/>
+              <a:t>24.03.2024</a:t>
+            </a:fld>
+            <a:endParaRPr lang="en-US"/>
+          </a:p>
+        </p:txBody>
+      </p:sp>
+      <p:sp>
+        <p:nvSpPr>
+          <p:cNvPr id="5" name="Slide Number Placeholder 4">
+            <a:extLst>
+              <a:ext uri="{FF2B5EF4-FFF2-40B4-BE49-F238E27FC236}">
+                <a16:creationId xmlns:a16="http://schemas.microsoft.com/office/drawing/2014/main" id="{076CA26A-1FE5-26BA-0292-22EC95F51E47}"/>
+              </a:ext>
+            </a:extLst>
+          </p:cNvPr>
+          <p:cNvSpPr>
+            <a:spLocks noGrp="1"/>
+          </p:cNvSpPr>
+          <p:nvPr>
+            <p:ph type="sldNum" sz="quarter" idx="12"/>
+          </p:nvPr>
+        </p:nvSpPr>
+        <p:spPr/>
+        <p:txBody>
+          <a:bodyPr/>
+          <a:lstStyle/>
+          <a:p>
+            <a:fld id="{DDE4B26F-E58A-4C83-9619-68F81596DFD8}" type="slidenum">
+              <a:rPr lang="en-US" smtClean="0"/>
+              <a:t>3</a:t>
+            </a:fld>
+            <a:endParaRPr lang="en-US"/>
+          </a:p>
+        </p:txBody>
+      </p:sp>
+    </p:spTree>
+    <p:extLst>
+      <p:ext uri="{BB962C8B-B14F-4D97-AF65-F5344CB8AC3E}">
+        <p14:creationId xmlns:p14="http://schemas.microsoft.com/office/powerpoint/2010/main" val="1174794736"/>
       </p:ext>
     </p:extLst>
   </p:cSld>
@@ -3720,4 +4285,299 @@
     </a:ext>
   </a:extLst>
 </a:theme>
+</file>
+
+<file path=ppt/theme/theme2.xml><?xml version="1.0" encoding="utf-8"?>
+<a:theme xmlns:a="http://schemas.openxmlformats.org/drawingml/2006/main" name="Office Theme">
+  <a:themeElements>
+    <a:clrScheme name="Office">
+      <a:dk1>
+        <a:sysClr val="windowText" lastClr="000000"/>
+      </a:dk1>
+      <a:lt1>
+        <a:sysClr val="window" lastClr="FFFFFF"/>
+      </a:lt1>
+      <a:dk2>
+        <a:srgbClr val="44546A"/>
+      </a:dk2>
+      <a:lt2>
+        <a:srgbClr val="E7E6E6"/>
+      </a:lt2>
+      <a:accent1>
+        <a:srgbClr val="4472C4"/>
+      </a:accent1>
+      <a:accent2>
+        <a:srgbClr val="ED7D31"/>
+      </a:accent2>
+      <a:accent3>
+        <a:srgbClr val="A5A5A5"/>
+      </a:accent3>
+      <a:accent4>
+        <a:srgbClr val="FFC000"/>
+      </a:accent4>
+      <a:accent5>
+        <a:srgbClr val="5B9BD5"/>
+      </a:accent5>
+      <a:accent6>
+        <a:srgbClr val="70AD47"/>
+      </a:accent6>
+      <a:hlink>
+        <a:srgbClr val="0563C1"/>
+      </a:hlink>
+      <a:folHlink>
+        <a:srgbClr val="954F72"/>
+      </a:folHlink>
+    </a:clrScheme>
+    <a:fontScheme name="Office">
+      <a:majorFont>
+        <a:latin typeface="Calibri Light" panose="020F0302020204030204"/>
+        <a:ea typeface=""/>
+        <a:cs typeface=""/>
+        <a:font script="Jpan" typeface="游ゴシック Light"/>
+        <a:font script="Hang" typeface="맑은 고딕"/>
+        <a:font script="Hans" typeface="等线 Light"/>
+        <a:font script="Hant" typeface="新細明體"/>
+        <a:font script="Arab" typeface="Times New Roman"/>
+        <a:font script="Hebr" typeface="Times New Roman"/>
+        <a:font script="Thai" typeface="Angsana New"/>
+        <a:font script="Ethi" typeface="Nyala"/>
+        <a:font script="Beng" typeface="Vrinda"/>
+        <a:font script="Gujr" typeface="Shruti"/>
+        <a:font script="Khmr" typeface="MoolBoran"/>
+        <a:font script="Knda" typeface="Tunga"/>
+        <a:font script="Guru" typeface="Raavi"/>
+        <a:font script="Cans" typeface="Euphemia"/>
+        <a:font script="Cher" typeface="Plantagenet Cherokee"/>
+        <a:font script="Yiii" typeface="Microsoft Yi Baiti"/>
+        <a:font script="Tibt" typeface="Microsoft Himalaya"/>
+        <a:font script="Thaa" typeface="MV Boli"/>
+        <a:font script="Deva" typeface="Mangal"/>
+        <a:font script="Telu" typeface="Gautami"/>
+        <a:font script="Taml" typeface="Latha"/>
+        <a:font script="Syrc" typeface="Estrangelo Edessa"/>
+        <a:font script="Orya" typeface="Kalinga"/>
+        <a:font script="Mlym" typeface="Kartika"/>
+        <a:font script="Laoo" typeface="DokChampa"/>
+        <a:font script="Sinh" typeface="Iskoola Pota"/>
+        <a:font script="Mong" typeface="Mongolian Baiti"/>
+        <a:font script="Viet" typeface="Times New Roman"/>
+        <a:font script="Uigh" typeface="Microsoft Uighur"/>
+        <a:font script="Geor" typeface="Sylfaen"/>
+        <a:font script="Armn" typeface="Arial"/>
+        <a:font script="Bugi" typeface="Leelawadee UI"/>
+        <a:font script="Bopo" typeface="Microsoft JhengHei"/>
+        <a:font script="Java" typeface="Javanese Text"/>
+        <a:font script="Lisu" typeface="Segoe UI"/>
+        <a:font script="Mymr" typeface="Myanmar Text"/>
+        <a:font script="Nkoo" typeface="Ebrima"/>
+        <a:font script="Olck" typeface="Nirmala UI"/>
+        <a:font script="Osma" typeface="Ebrima"/>
+        <a:font script="Phag" typeface="Phagspa"/>
+        <a:font script="Syrn" typeface="Estrangelo Edessa"/>
+        <a:font script="Syrj" typeface="Estrangelo Edessa"/>
+        <a:font script="Syre" typeface="Estrangelo Edessa"/>
+        <a:font script="Sora" typeface="Nirmala UI"/>
+        <a:font script="Tale" typeface="Microsoft Tai Le"/>
+        <a:font script="Talu" typeface="Microsoft New Tai Lue"/>
+        <a:font script="Tfng" typeface="Ebrima"/>
+      </a:majorFont>
+      <a:minorFont>
+        <a:latin typeface="Calibri" panose="020F0502020204030204"/>
+        <a:ea typeface=""/>
+        <a:cs typeface=""/>
+        <a:font script="Jpan" typeface="游ゴシック"/>
+        <a:font script="Hang" typeface="맑은 고딕"/>
+        <a:font script="Hans" typeface="等线"/>
+        <a:font script="Hant" typeface="新細明體"/>
+        <a:font script="Arab" typeface="Arial"/>
+        <a:font script="Hebr" typeface="Arial"/>
+        <a:font script="Thai" typeface="Cordia New"/>
+        <a:font script="Ethi" typeface="Nyala"/>
+        <a:font script="Beng" typeface="Vrinda"/>
+        <a:font script="Gujr" typeface="Shruti"/>
+        <a:font script="Khmr" typeface="DaunPenh"/>
+        <a:font script="Knda" typeface="Tunga"/>
+        <a:font script="Guru" typeface="Raavi"/>
+        <a:font script="Cans" typeface="Euphemia"/>
+        <a:font script="Cher" typeface="Plantagenet Cherokee"/>
+        <a:font script="Yiii" typeface="Microsoft Yi Baiti"/>
+        <a:font script="Tibt" typeface="Microsoft Himalaya"/>
+        <a:font script="Thaa" typeface="MV Boli"/>
+        <a:font script="Deva" typeface="Mangal"/>
+        <a:font script="Telu" typeface="Gautami"/>
+        <a:font script="Taml" typeface="Latha"/>
+        <a:font script="Syrc" typeface="Estrangelo Edessa"/>
+        <a:font script="Orya" typeface="Kalinga"/>
+        <a:font script="Mlym" typeface="Kartika"/>
+        <a:font script="Laoo" typeface="DokChampa"/>
+        <a:font script="Sinh" typeface="Iskoola Pota"/>
+        <a:font script="Mong" typeface="Mongolian Baiti"/>
+        <a:font script="Viet" typeface="Arial"/>
+        <a:font script="Uigh" typeface="Microsoft Uighur"/>
+        <a:font script="Geor" typeface="Sylfaen"/>
+        <a:font script="Armn" typeface="Arial"/>
+        <a:font script="Bugi" typeface="Leelawadee UI"/>
+        <a:font script="Bopo" typeface="Microsoft JhengHei"/>
+        <a:font script="Java" typeface="Javanese Text"/>
+        <a:font script="Lisu" typeface="Segoe UI"/>
+        <a:font script="Mymr" typeface="Myanmar Text"/>
+        <a:font script="Nkoo" typeface="Ebrima"/>
+        <a:font script="Olck" typeface="Nirmala UI"/>
+        <a:font script="Osma" typeface="Ebrima"/>
+        <a:font script="Phag" typeface="Phagspa"/>
+        <a:font script="Syrn" typeface="Estrangelo Edessa"/>
+        <a:font script="Syrj" typeface="Estrangelo Edessa"/>
+        <a:font script="Syre" typeface="Estrangelo Edessa"/>
+        <a:font script="Sora" typeface="Nirmala UI"/>
+        <a:font script="Tale" typeface="Microsoft Tai Le"/>
+        <a:font script="Talu" typeface="Microsoft New Tai Lue"/>
+        <a:font script="Tfng" typeface="Ebrima"/>
+      </a:minorFont>
+    </a:fontScheme>
+    <a:fmtScheme name="Office">
+      <a:fillStyleLst>
+        <a:solidFill>
+          <a:schemeClr val="phClr"/>
+        </a:solidFill>
+        <a:gradFill rotWithShape="1">
+          <a:gsLst>
+            <a:gs pos="0">
+              <a:schemeClr val="phClr">
+                <a:lumMod val="110000"/>
+                <a:satMod val="105000"/>
+                <a:tint val="67000"/>
+              </a:schemeClr>
+            </a:gs>
+            <a:gs pos="50000">
+              <a:schemeClr val="phClr">
+                <a:lumMod val="105000"/>
+                <a:satMod val="103000"/>
+                <a:tint val="73000"/>
+              </a:schemeClr>
+            </a:gs>
+            <a:gs pos="100000">
+              <a:schemeClr val="phClr">
+                <a:lumMod val="105000"/>
+                <a:satMod val="109000"/>
+                <a:tint val="81000"/>
+              </a:schemeClr>
+            </a:gs>
+          </a:gsLst>
+          <a:lin ang="5400000" scaled="0"/>
+        </a:gradFill>
+        <a:gradFill rotWithShape="1">
+          <a:gsLst>
+            <a:gs pos="0">
+              <a:schemeClr val="phClr">
+                <a:satMod val="103000"/>
+                <a:lumMod val="102000"/>
+                <a:tint val="94000"/>
+              </a:schemeClr>
+            </a:gs>
+            <a:gs pos="50000">
+              <a:schemeClr val="phClr">
+                <a:satMod val="110000"/>
+                <a:lumMod val="100000"/>
+                <a:shade val="100000"/>
+              </a:schemeClr>
+            </a:gs>
+            <a:gs pos="100000">
+              <a:schemeClr val="phClr">
+                <a:lumMod val="99000"/>
+                <a:satMod val="120000"/>
+                <a:shade val="78000"/>
+              </a:schemeClr>
+            </a:gs>
+          </a:gsLst>
+          <a:lin ang="5400000" scaled="0"/>
+        </a:gradFill>
+      </a:fillStyleLst>
+      <a:lnStyleLst>
+        <a:ln w="6350" cap="flat" cmpd="sng" algn="ctr">
+          <a:solidFill>
+            <a:schemeClr val="phClr"/>
+          </a:solidFill>
+          <a:prstDash val="solid"/>
+          <a:miter lim="800000"/>
+        </a:ln>
+        <a:ln w="12700" cap="flat" cmpd="sng" algn="ctr">
+          <a:solidFill>
+            <a:schemeClr val="phClr"/>
+          </a:solidFill>
+          <a:prstDash val="solid"/>
+          <a:miter lim="800000"/>
+        </a:ln>
+        <a:ln w="19050" cap="flat" cmpd="sng" algn="ctr">
+          <a:solidFill>
+            <a:schemeClr val="phClr"/>
+          </a:solidFill>
+          <a:prstDash val="solid"/>
+          <a:miter lim="800000"/>
+        </a:ln>
+      </a:lnStyleLst>
+      <a:effectStyleLst>
+        <a:effectStyle>
+          <a:effectLst/>
+        </a:effectStyle>
+        <a:effectStyle>
+          <a:effectLst/>
+        </a:effectStyle>
+        <a:effectStyle>
+          <a:effectLst>
+            <a:outerShdw blurRad="57150" dist="19050" dir="5400000" algn="ctr" rotWithShape="0">
+              <a:srgbClr val="000000">
+                <a:alpha val="63000"/>
+              </a:srgbClr>
+            </a:outerShdw>
+          </a:effectLst>
+        </a:effectStyle>
+      </a:effectStyleLst>
+      <a:bgFillStyleLst>
+        <a:solidFill>
+          <a:schemeClr val="phClr"/>
+        </a:solidFill>
+        <a:solidFill>
+          <a:schemeClr val="phClr">
+            <a:tint val="95000"/>
+            <a:satMod val="170000"/>
+          </a:schemeClr>
+        </a:solidFill>
+        <a:gradFill rotWithShape="1">
+          <a:gsLst>
+            <a:gs pos="0">
+              <a:schemeClr val="phClr">
+                <a:tint val="93000"/>
+                <a:satMod val="150000"/>
+                <a:shade val="98000"/>
+                <a:lumMod val="102000"/>
+              </a:schemeClr>
+            </a:gs>
+            <a:gs pos="50000">
+              <a:schemeClr val="phClr">
+                <a:tint val="98000"/>
+                <a:satMod val="130000"/>
+                <a:shade val="90000"/>
+                <a:lumMod val="103000"/>
+              </a:schemeClr>
+            </a:gs>
+            <a:gs pos="100000">
+              <a:schemeClr val="phClr">
+                <a:shade val="63000"/>
+                <a:satMod val="120000"/>
+              </a:schemeClr>
+            </a:gs>
+          </a:gsLst>
+          <a:lin ang="5400000" scaled="0"/>
+        </a:gradFill>
+      </a:bgFillStyleLst>
+    </a:fmtScheme>
+  </a:themeElements>
+  <a:objectDefaults/>
+  <a:extraClrSchemeLst/>
+  <a:extLst>
+    <a:ext uri="{05A4C25C-085E-4340-85A3-A5531E510DB2}">
+      <thm15:themeFamily xmlns:thm15="http://schemas.microsoft.com/office/thememl/2012/main" name="Office Theme" id="{62F939B6-93AF-4DB8-9C6B-D6C7DFDC589F}" vid="{4A3C46E8-61CC-4603-A589-7422A47A8E4A}"/>
+    </a:ext>
+  </a:extLst>
+</a:theme>
 </file>
</xml_diff>

<commit_message>
Added content to pptx
</commit_message>
<xml_diff>
--- a/source/MySEProject/Documentation/Implement_the_KNN__Classifier_KNN_Quest.pptx
+++ b/source/MySEProject/Documentation/Implement_the_KNN__Classifier_KNN_Quest.pptx
@@ -5,12 +5,13 @@
     <p:sldMasterId id="2147483648" r:id="rId1"/>
   </p:sldMasterIdLst>
   <p:notesMasterIdLst>
-    <p:notesMasterId r:id="rId5"/>
+    <p:notesMasterId r:id="rId6"/>
   </p:notesMasterIdLst>
   <p:sldIdLst>
     <p:sldId id="256" r:id="rId2"/>
     <p:sldId id="257" r:id="rId3"/>
     <p:sldId id="258" r:id="rId4"/>
+    <p:sldId id="259" r:id="rId5"/>
   </p:sldIdLst>
   <p:sldSz cx="12192000" cy="6858000"/>
   <p:notesSz cx="6858000" cy="9144000"/>
@@ -3673,107 +3674,115 @@
         </p:nvSpPr>
         <p:spPr/>
         <p:txBody>
-          <a:bodyPr/>
-          <a:lstStyle/>
-          <a:p>
-            <a:r>
-              <a:rPr lang="en-US" dirty="0"/>
-              <a:t>Methodology</a:t>
-            </a:r>
-          </a:p>
-        </p:txBody>
-      </p:sp>
-      <p:sp>
-        <p:nvSpPr>
-          <p:cNvPr id="3" name="Content Placeholder 2">
-            <a:extLst>
-              <a:ext uri="{FF2B5EF4-FFF2-40B4-BE49-F238E27FC236}">
-                <a16:creationId xmlns:a16="http://schemas.microsoft.com/office/drawing/2014/main" id="{CF20EB18-1BC5-7F2D-B706-4F98936B38BC}"/>
-              </a:ext>
-            </a:extLst>
-          </p:cNvPr>
-          <p:cNvSpPr>
-            <a:spLocks noGrp="1"/>
-          </p:cNvSpPr>
-          <p:nvPr>
-            <p:ph idx="1"/>
-          </p:nvPr>
-        </p:nvSpPr>
-        <p:spPr/>
-        <p:txBody>
           <a:bodyPr>
             <a:normAutofit/>
           </a:bodyPr>
           <a:lstStyle/>
           <a:p>
             <a:r>
-              <a:rPr lang="en-US" dirty="0">
-                <a:latin typeface="Pristina" panose="03060402040406080204" pitchFamily="66" charset="0"/>
+              <a:rPr lang="en-US" sz="4000" dirty="0">
+                <a:latin typeface="Arial Rounded MT Bold" panose="020F0704030504030204" pitchFamily="34" charset="0"/>
               </a:rPr>
-              <a:t>Introduction to KNN Classifier</a:t>
-            </a:r>
-          </a:p>
-          <a:p>
-            <a:r>
-              <a:rPr lang="en-US" dirty="0">
-                <a:latin typeface="Pristina" panose="03060402040406080204" pitchFamily="66" charset="0"/>
+              <a:t>Methodology</a:t>
+            </a:r>
+          </a:p>
+        </p:txBody>
+      </p:sp>
+      <p:sp>
+        <p:nvSpPr>
+          <p:cNvPr id="3" name="Content Placeholder 2">
+            <a:extLst>
+              <a:ext uri="{FF2B5EF4-FFF2-40B4-BE49-F238E27FC236}">
+                <a16:creationId xmlns:a16="http://schemas.microsoft.com/office/drawing/2014/main" id="{CF20EB18-1BC5-7F2D-B706-4F98936B38BC}"/>
+              </a:ext>
+            </a:extLst>
+          </p:cNvPr>
+          <p:cNvSpPr>
+            <a:spLocks noGrp="1"/>
+          </p:cNvSpPr>
+          <p:nvPr>
+            <p:ph idx="1"/>
+          </p:nvPr>
+        </p:nvSpPr>
+        <p:spPr>
+          <a:xfrm>
+            <a:off x="838200" y="1825625"/>
+            <a:ext cx="10515600" cy="4451350"/>
+          </a:xfrm>
+        </p:spPr>
+        <p:txBody>
+          <a:bodyPr>
+            <a:normAutofit/>
+          </a:bodyPr>
+          <a:lstStyle/>
+          <a:p>
+            <a:r>
+              <a:rPr lang="en-US" sz="2000" dirty="0">
+                <a:latin typeface="Arial Rounded MT Bold" panose="020F0704030504030204" pitchFamily="34" charset="0"/>
               </a:rPr>
-              <a:t>Implementation of Native KNN classifier</a:t>
-            </a:r>
-          </a:p>
-          <a:p>
-            <a:r>
-              <a:rPr lang="en-US" dirty="0">
-                <a:latin typeface="Pristina" panose="03060402040406080204" pitchFamily="66" charset="0"/>
+              <a:t>Problem statement</a:t>
+            </a:r>
+          </a:p>
+          <a:p>
+            <a:r>
+              <a:rPr lang="en-US" sz="2000" dirty="0">
+                <a:latin typeface="Arial Rounded MT Bold" panose="020F0704030504030204" pitchFamily="34" charset="0"/>
               </a:rPr>
-              <a:t>Integration of KNN classifier with </a:t>
-            </a:r>
-            <a:r>
-              <a:rPr lang="en-US" dirty="0" err="1">
-                <a:latin typeface="Pristina" panose="03060402040406080204" pitchFamily="66" charset="0"/>
+              <a:t>Introduction to KNN classifier </a:t>
+            </a:r>
+          </a:p>
+          <a:p>
+            <a:r>
+              <a:rPr lang="en-US" sz="2000" dirty="0">
+                <a:latin typeface="Arial Rounded MT Bold" panose="020F0704030504030204" pitchFamily="34" charset="0"/>
               </a:rPr>
-              <a:t>NeocortexAPI</a:t>
-            </a:r>
-            <a:endParaRPr lang="en-US" dirty="0">
-              <a:latin typeface="Pristina" panose="03060402040406080204" pitchFamily="66" charset="0"/>
-            </a:endParaRPr>
-          </a:p>
-          <a:p>
-            <a:r>
-              <a:rPr lang="en-US" dirty="0">
-                <a:latin typeface="Pristina" panose="03060402040406080204" pitchFamily="66" charset="0"/>
+              <a:t>Implementation of Native KNN classifier </a:t>
+            </a:r>
+          </a:p>
+          <a:p>
+            <a:r>
+              <a:rPr lang="en-US" sz="2000" dirty="0">
+                <a:latin typeface="Arial Rounded MT Bold" panose="020F0704030504030204" pitchFamily="34" charset="0"/>
+              </a:rPr>
+              <a:t>Integration of KNN classifier with Neocortex API</a:t>
+            </a:r>
+          </a:p>
+          <a:p>
+            <a:r>
+              <a:rPr lang="en-US" sz="2000" dirty="0">
+                <a:latin typeface="Arial Rounded MT Bold" panose="020F0704030504030204" pitchFamily="34" charset="0"/>
               </a:rPr>
               <a:t>Implementation of KNN Classifier with Spatial Pooler generated SDRs</a:t>
             </a:r>
           </a:p>
           <a:p>
             <a:r>
-              <a:rPr lang="en-US" dirty="0">
-                <a:latin typeface="Pristina" panose="03060402040406080204" pitchFamily="66" charset="0"/>
+              <a:rPr lang="en-US" sz="2000" dirty="0">
+                <a:latin typeface="Arial Rounded MT Bold" panose="020F0704030504030204" pitchFamily="34" charset="0"/>
               </a:rPr>
               <a:t>Unit testing</a:t>
             </a:r>
           </a:p>
           <a:p>
             <a:r>
-              <a:rPr lang="en-US" dirty="0">
-                <a:latin typeface="Pristina" panose="03060402040406080204" pitchFamily="66" charset="0"/>
+              <a:rPr lang="en-US" sz="2000" dirty="0">
+                <a:latin typeface="Arial Rounded MT Bold" panose="020F0704030504030204" pitchFamily="34" charset="0"/>
               </a:rPr>
-              <a:t>Results and Discussion </a:t>
-            </a:r>
-          </a:p>
-          <a:p>
-            <a:r>
-              <a:rPr lang="en-US" dirty="0">
-                <a:latin typeface="Pristina" panose="03060402040406080204" pitchFamily="66" charset="0"/>
+              <a:t>Discussion </a:t>
+            </a:r>
+          </a:p>
+          <a:p>
+            <a:r>
+              <a:rPr lang="en-US" sz="2000" dirty="0">
+                <a:latin typeface="Arial Rounded MT Bold" panose="020F0704030504030204" pitchFamily="34" charset="0"/>
               </a:rPr>
               <a:t>Conclusion</a:t>
             </a:r>
           </a:p>
           <a:p>
             <a:r>
-              <a:rPr lang="en-US" dirty="0">
-                <a:latin typeface="Pristina" panose="03060402040406080204" pitchFamily="66" charset="0"/>
+              <a:rPr lang="en-US" sz="2000" dirty="0">
+                <a:latin typeface="Arial Rounded MT Bold" panose="020F0704030504030204" pitchFamily="34" charset="0"/>
               </a:rPr>
               <a:t>References</a:t>
             </a:r>
@@ -3805,7 +3814,7 @@
               <a:rPr lang="de-DE" smtClean="0"/>
               <a:t>24.03.2024</a:t>
             </a:fld>
-            <a:endParaRPr lang="en-US"/>
+            <a:endParaRPr lang="en-US" dirty="0"/>
           </a:p>
         </p:txBody>
       </p:sp>
@@ -3886,12 +3895,16 @@
         </p:nvSpPr>
         <p:spPr/>
         <p:txBody>
-          <a:bodyPr/>
-          <a:lstStyle/>
-          <a:p>
-            <a:r>
-              <a:rPr lang="en-US" dirty="0"/>
-              <a:t>Introduction to KNN Classifier</a:t>
+          <a:bodyPr>
+            <a:normAutofit/>
+          </a:bodyPr>
+          <a:lstStyle/>
+          <a:p>
+            <a:r>
+              <a:rPr lang="en-US" sz="4000" dirty="0">
+                <a:latin typeface="Arial Rounded MT Bold" panose="020F0704030504030204" pitchFamily="34" charset="0"/>
+              </a:rPr>
+              <a:t>Problem statement</a:t>
             </a:r>
           </a:p>
         </p:txBody>
@@ -3983,6 +3996,148 @@
     <p:extLst>
       <p:ext uri="{BB962C8B-B14F-4D97-AF65-F5344CB8AC3E}">
         <p14:creationId xmlns:p14="http://schemas.microsoft.com/office/powerpoint/2010/main" val="1174794736"/>
+      </p:ext>
+    </p:extLst>
+  </p:cSld>
+  <p:clrMapOvr>
+    <a:masterClrMapping/>
+  </p:clrMapOvr>
+</p:sld>
+</file>
+
+<file path=ppt/slides/slide4.xml><?xml version="1.0" encoding="utf-8"?>
+<p:sld xmlns:a="http://schemas.openxmlformats.org/drawingml/2006/main" xmlns:r="http://schemas.openxmlformats.org/officeDocument/2006/relationships" xmlns:p="http://schemas.openxmlformats.org/presentationml/2006/main">
+  <p:cSld>
+    <p:spTree>
+      <p:nvGrpSpPr>
+        <p:cNvPr id="1" name=""/>
+        <p:cNvGrpSpPr/>
+        <p:nvPr/>
+      </p:nvGrpSpPr>
+      <p:grpSpPr>
+        <a:xfrm>
+          <a:off x="0" y="0"/>
+          <a:ext cx="0" cy="0"/>
+          <a:chOff x="0" y="0"/>
+          <a:chExt cx="0" cy="0"/>
+        </a:xfrm>
+      </p:grpSpPr>
+      <p:sp>
+        <p:nvSpPr>
+          <p:cNvPr id="2" name="Title 1">
+            <a:extLst>
+              <a:ext uri="{FF2B5EF4-FFF2-40B4-BE49-F238E27FC236}">
+                <a16:creationId xmlns:a16="http://schemas.microsoft.com/office/drawing/2014/main" id="{3E02F06B-A1AE-5741-0C5C-5D811A4154F9}"/>
+              </a:ext>
+            </a:extLst>
+          </p:cNvPr>
+          <p:cNvSpPr>
+            <a:spLocks noGrp="1"/>
+          </p:cNvSpPr>
+          <p:nvPr>
+            <p:ph type="title"/>
+          </p:nvPr>
+        </p:nvSpPr>
+        <p:spPr/>
+        <p:txBody>
+          <a:bodyPr/>
+          <a:lstStyle/>
+          <a:p>
+            <a:r>
+              <a:rPr lang="en-US"/>
+              <a:t>Machine</a:t>
+            </a:r>
+            <a:endParaRPr lang="en-US" dirty="0"/>
+          </a:p>
+        </p:txBody>
+      </p:sp>
+      <p:sp>
+        <p:nvSpPr>
+          <p:cNvPr id="3" name="Content Placeholder 2">
+            <a:extLst>
+              <a:ext uri="{FF2B5EF4-FFF2-40B4-BE49-F238E27FC236}">
+                <a16:creationId xmlns:a16="http://schemas.microsoft.com/office/drawing/2014/main" id="{746C3CD2-0151-1F7D-0B83-685A9DA9EF39}"/>
+              </a:ext>
+            </a:extLst>
+          </p:cNvPr>
+          <p:cNvSpPr>
+            <a:spLocks noGrp="1"/>
+          </p:cNvSpPr>
+          <p:nvPr>
+            <p:ph idx="1"/>
+          </p:nvPr>
+        </p:nvSpPr>
+        <p:spPr/>
+        <p:txBody>
+          <a:bodyPr/>
+          <a:lstStyle/>
+          <a:p>
+            <a:endParaRPr lang="en-US" dirty="0"/>
+          </a:p>
+        </p:txBody>
+      </p:sp>
+      <p:sp>
+        <p:nvSpPr>
+          <p:cNvPr id="4" name="Date Placeholder 3">
+            <a:extLst>
+              <a:ext uri="{FF2B5EF4-FFF2-40B4-BE49-F238E27FC236}">
+                <a16:creationId xmlns:a16="http://schemas.microsoft.com/office/drawing/2014/main" id="{F9FA9D6C-5FD9-2F3D-2382-6F790A1D1DCC}"/>
+              </a:ext>
+            </a:extLst>
+          </p:cNvPr>
+          <p:cNvSpPr>
+            <a:spLocks noGrp="1"/>
+          </p:cNvSpPr>
+          <p:nvPr>
+            <p:ph type="dt" sz="half" idx="10"/>
+          </p:nvPr>
+        </p:nvSpPr>
+        <p:spPr/>
+        <p:txBody>
+          <a:bodyPr/>
+          <a:lstStyle/>
+          <a:p>
+            <a:fld id="{89E62C9B-B452-4322-936F-91A12848BB5E}" type="datetime1">
+              <a:rPr lang="de-DE" smtClean="0"/>
+              <a:t>24.03.2024</a:t>
+            </a:fld>
+            <a:endParaRPr lang="en-US"/>
+          </a:p>
+        </p:txBody>
+      </p:sp>
+      <p:sp>
+        <p:nvSpPr>
+          <p:cNvPr id="5" name="Slide Number Placeholder 4">
+            <a:extLst>
+              <a:ext uri="{FF2B5EF4-FFF2-40B4-BE49-F238E27FC236}">
+                <a16:creationId xmlns:a16="http://schemas.microsoft.com/office/drawing/2014/main" id="{E135BA10-9A3F-E33D-B308-D6C50B64EF62}"/>
+              </a:ext>
+            </a:extLst>
+          </p:cNvPr>
+          <p:cNvSpPr>
+            <a:spLocks noGrp="1"/>
+          </p:cNvSpPr>
+          <p:nvPr>
+            <p:ph type="sldNum" sz="quarter" idx="12"/>
+          </p:nvPr>
+        </p:nvSpPr>
+        <p:spPr/>
+        <p:txBody>
+          <a:bodyPr/>
+          <a:lstStyle/>
+          <a:p>
+            <a:fld id="{DDE4B26F-E58A-4C83-9619-68F81596DFD8}" type="slidenum">
+              <a:rPr lang="en-US" smtClean="0"/>
+              <a:t>4</a:t>
+            </a:fld>
+            <a:endParaRPr lang="en-US"/>
+          </a:p>
+        </p:txBody>
+      </p:sp>
+    </p:spTree>
+    <p:extLst>
+      <p:ext uri="{BB962C8B-B14F-4D97-AF65-F5344CB8AC3E}">
+        <p14:creationId xmlns:p14="http://schemas.microsoft.com/office/powerpoint/2010/main" val="2397003531"/>
       </p:ext>
     </p:extLst>
   </p:cSld>

</xml_diff>

<commit_message>
Modifying Data for KNN
</commit_message>
<xml_diff>
--- a/source/MySEProject/Documentation/Implement_the_KNN__Classifier_KNN_Quest.pptx
+++ b/source/MySEProject/Documentation/Implement_the_KNN__Classifier_KNN_Quest.pptx
@@ -6636,7 +6636,7 @@
         </p:nvSpPr>
         <p:spPr>
           <a:xfrm>
-            <a:off x="838200" y="1825625"/>
+            <a:off x="1130431" y="2598623"/>
             <a:ext cx="10515600" cy="4451350"/>
           </a:xfrm>
         </p:spPr>
@@ -6647,7 +6647,7 @@
           <a:lstStyle/>
           <a:p>
             <a:r>
-              <a:rPr lang="en-US" sz="2000" dirty="0">
+              <a:rPr lang="en-US" sz="1600" dirty="0">
                 <a:latin typeface="Arial Rounded MT Bold" panose="020F0704030504030204" pitchFamily="34" charset="0"/>
               </a:rPr>
               <a:t>Problem statement</a:t>
@@ -6655,7 +6655,7 @@
           </a:p>
           <a:p>
             <a:r>
-              <a:rPr lang="en-US" sz="2000" dirty="0">
+              <a:rPr lang="en-US" sz="1600" dirty="0">
                 <a:latin typeface="Arial Rounded MT Bold" panose="020F0704030504030204" pitchFamily="34" charset="0"/>
               </a:rPr>
               <a:t>Introduction to KNN classifier </a:t>
@@ -6663,7 +6663,7 @@
           </a:p>
           <a:p>
             <a:r>
-              <a:rPr lang="en-US" sz="2000" dirty="0">
+              <a:rPr lang="en-US" sz="1600" dirty="0">
                 <a:latin typeface="Arial Rounded MT Bold" panose="020F0704030504030204" pitchFamily="34" charset="0"/>
               </a:rPr>
               <a:t>Implementation of Native KNN classifier </a:t>
@@ -6671,7 +6671,7 @@
           </a:p>
           <a:p>
             <a:r>
-              <a:rPr lang="en-US" sz="2000" dirty="0">
+              <a:rPr lang="en-US" sz="1600" dirty="0">
                 <a:latin typeface="Arial Rounded MT Bold" panose="020F0704030504030204" pitchFamily="34" charset="0"/>
               </a:rPr>
               <a:t>Integration of KNN classifier with Neocortex API</a:t>
@@ -6679,7 +6679,7 @@
           </a:p>
           <a:p>
             <a:r>
-              <a:rPr lang="en-US" sz="2000" dirty="0">
+              <a:rPr lang="en-US" sz="1600" dirty="0">
                 <a:latin typeface="Arial Rounded MT Bold" panose="020F0704030504030204" pitchFamily="34" charset="0"/>
               </a:rPr>
               <a:t>Implementation of KNN Classifier with Spatial Pooler generated SDRs</a:t>
@@ -6687,7 +6687,7 @@
           </a:p>
           <a:p>
             <a:r>
-              <a:rPr lang="en-US" sz="2000" dirty="0">
+              <a:rPr lang="en-US" sz="1600" dirty="0">
                 <a:latin typeface="Arial Rounded MT Bold" panose="020F0704030504030204" pitchFamily="34" charset="0"/>
               </a:rPr>
               <a:t>Unit testing</a:t>
@@ -6695,7 +6695,7 @@
           </a:p>
           <a:p>
             <a:r>
-              <a:rPr lang="en-US" sz="2000" dirty="0">
+              <a:rPr lang="en-US" sz="1600" dirty="0">
                 <a:latin typeface="Arial Rounded MT Bold" panose="020F0704030504030204" pitchFamily="34" charset="0"/>
               </a:rPr>
               <a:t>Discussion </a:t>
@@ -6703,7 +6703,7 @@
           </a:p>
           <a:p>
             <a:r>
-              <a:rPr lang="en-US" sz="2000" dirty="0">
+              <a:rPr lang="en-US" sz="1600" dirty="0">
                 <a:latin typeface="Arial Rounded MT Bold" panose="020F0704030504030204" pitchFamily="34" charset="0"/>
               </a:rPr>
               <a:t>Conclusion</a:t>
@@ -6711,7 +6711,7 @@
           </a:p>
           <a:p>
             <a:r>
-              <a:rPr lang="en-US" sz="2000" dirty="0">
+              <a:rPr lang="en-US" sz="1600" dirty="0">
                 <a:latin typeface="Arial Rounded MT Bold" panose="020F0704030504030204" pitchFamily="34" charset="0"/>
               </a:rPr>
               <a:t>References</a:t>
@@ -6857,10 +6857,67 @@
         </p:nvSpPr>
         <p:spPr/>
         <p:txBody>
-          <a:bodyPr/>
-          <a:lstStyle/>
-          <a:p>
-            <a:endParaRPr lang="en-US" dirty="0"/>
+          <a:bodyPr>
+            <a:normAutofit/>
+          </a:bodyPr>
+          <a:lstStyle/>
+          <a:p>
+            <a:r>
+              <a:rPr lang="en-US" sz="1800" b="1" dirty="0"/>
+              <a:t>KNN Challenges: High Dimensions &amp; Imbalanced Data</a:t>
+            </a:r>
+          </a:p>
+          <a:p>
+            <a:r>
+              <a:rPr lang="en-US" sz="1800" b="1" dirty="0"/>
+              <a:t>KNN:</a:t>
+            </a:r>
+            <a:r>
+              <a:rPr lang="en-US" sz="1800" dirty="0"/>
+              <a:t> Simple and effective classifier.</a:t>
+            </a:r>
+          </a:p>
+          <a:p>
+            <a:r>
+              <a:rPr lang="en-US" sz="1800" b="1" dirty="0"/>
+              <a:t>Limitations:</a:t>
+            </a:r>
+            <a:endParaRPr lang="en-US" sz="1800" dirty="0"/>
+          </a:p>
+          <a:p>
+            <a:pPr lvl="1"/>
+            <a:r>
+              <a:rPr lang="en-US" sz="1800" b="1" dirty="0"/>
+              <a:t>High Dimensions:</a:t>
+            </a:r>
+            <a:r>
+              <a:rPr lang="en-US" sz="1800" dirty="0"/>
+              <a:t> Distances become unreliable, leading to inaccurate classification.</a:t>
+            </a:r>
+          </a:p>
+          <a:p>
+            <a:pPr lvl="1"/>
+            <a:r>
+              <a:rPr lang="en-US" sz="1800" b="1" dirty="0"/>
+              <a:t>Imbalanced Classes:</a:t>
+            </a:r>
+            <a:r>
+              <a:rPr lang="en-US" sz="1800" dirty="0"/>
+              <a:t> Biased towards majority class, neglecting minority.</a:t>
+            </a:r>
+          </a:p>
+          <a:p>
+            <a:r>
+              <a:rPr lang="en-US" sz="1800" b="1" dirty="0"/>
+              <a:t>Goal:</a:t>
+            </a:r>
+            <a:r>
+              <a:rPr lang="en-US" sz="1800" dirty="0"/>
+              <a:t> Improve KNN for these scenarios.</a:t>
+            </a:r>
+          </a:p>
+          <a:p>
+            <a:endParaRPr lang="en-US" sz="1800" dirty="0"/>
           </a:p>
         </p:txBody>
       </p:sp>

</xml_diff>